<commit_message>
Final touches for Week 1
</commit_message>
<xml_diff>
--- a/PPTs/Week1.pptx
+++ b/PPTs/Week1.pptx
@@ -17,6 +17,16 @@
     <p:sldId id="266" r:id="rId11"/>
     <p:sldId id="267" r:id="rId12"/>
     <p:sldId id="264" r:id="rId13"/>
+    <p:sldId id="268" r:id="rId14"/>
+    <p:sldId id="269" r:id="rId15"/>
+    <p:sldId id="270" r:id="rId16"/>
+    <p:sldId id="271" r:id="rId17"/>
+    <p:sldId id="272" r:id="rId18"/>
+    <p:sldId id="273" r:id="rId19"/>
+    <p:sldId id="274" r:id="rId20"/>
+    <p:sldId id="275" r:id="rId21"/>
+    <p:sldId id="276" r:id="rId22"/>
+    <p:sldId id="277" r:id="rId23"/>
   </p:sldIdLst>
   <p:sldSz cx="12192000" cy="6858000"/>
   <p:notesSz cx="6858000" cy="9144000"/>
@@ -115,6 +125,11 @@
       </a:defRPr>
     </a:lvl9pPr>
   </p:defaultTextStyle>
+  <p:extLst>
+    <p:ext uri="{EFAFB233-063F-42B5-8137-9DF3F51BA10A}">
+      <p15:sldGuideLst xmlns:p15="http://schemas.microsoft.com/office/powerpoint/2012/main"/>
+    </p:ext>
+  </p:extLst>
 </p:presentation>
 </file>
 
@@ -14108,7 +14123,7 @@
           <a:p>
             <a:r>
               <a:rPr lang="en-US" dirty="0"/>
-              <a:t>Let’s write our first program!</a:t>
+              <a:t>Access the Exercises</a:t>
             </a:r>
             <a:endParaRPr lang="en-CA" dirty="0"/>
           </a:p>
@@ -14130,6 +14145,127 @@
             <p:ph idx="1"/>
           </p:nvPr>
         </p:nvSpPr>
+        <p:spPr>
+          <a:xfrm>
+            <a:off x="617157" y="2480606"/>
+            <a:ext cx="5407536" cy="3936447"/>
+          </a:xfrm>
+        </p:spPr>
+        <p:txBody>
+          <a:bodyPr>
+            <a:normAutofit/>
+          </a:bodyPr>
+          <a:lstStyle/>
+          <a:p>
+            <a:r>
+              <a:rPr lang="en-US" sz="2400" dirty="0"/>
+              <a:t>Click on the following link to access the </a:t>
+            </a:r>
+            <a:r>
+              <a:rPr lang="fr-CA" sz="2400" dirty="0"/>
+              <a:t>Banque d’exercices:</a:t>
+            </a:r>
+          </a:p>
+          <a:p>
+            <a:pPr lvl="1"/>
+            <a:r>
+              <a:rPr lang="en-CA" sz="2000" dirty="0">
+                <a:hlinkClick r:id="rId2"/>
+              </a:rPr>
+              <a:t>https://github.com/baron-de-montrouge/Intro-to-Python</a:t>
+            </a:r>
+            <a:endParaRPr lang="en-CA" sz="2000" dirty="0"/>
+          </a:p>
+          <a:p>
+            <a:r>
+              <a:rPr lang="en-CA" sz="2400" dirty="0"/>
+              <a:t>We will want to “fork” this repository onto our own computer</a:t>
+            </a:r>
+          </a:p>
+          <a:p>
+            <a:r>
+              <a:rPr lang="en-CA" sz="2400" dirty="0"/>
+              <a:t>This will allow you to “own” the repo and modify it freely!</a:t>
+            </a:r>
+          </a:p>
+        </p:txBody>
+      </p:sp>
+      <p:pic>
+        <p:nvPicPr>
+          <p:cNvPr id="5" name="Picture 4">
+            <a:extLst>
+              <a:ext uri="{FF2B5EF4-FFF2-40B4-BE49-F238E27FC236}">
+                <a16:creationId xmlns:a16="http://schemas.microsoft.com/office/drawing/2014/main" id="{D383D15E-0E45-CBD6-C04D-7DFE6B7DBE9B}"/>
+              </a:ext>
+            </a:extLst>
+          </p:cNvPr>
+          <p:cNvPicPr>
+            <a:picLocks noChangeAspect="1"/>
+          </p:cNvPicPr>
+          <p:nvPr/>
+        </p:nvPicPr>
+        <p:blipFill>
+          <a:blip r:embed="rId3"/>
+          <a:stretch>
+            <a:fillRect/>
+          </a:stretch>
+        </p:blipFill>
+        <p:spPr>
+          <a:xfrm>
+            <a:off x="6331225" y="2297246"/>
+            <a:ext cx="5142387" cy="4421605"/>
+          </a:xfrm>
+          <a:prstGeom prst="rect">
+            <a:avLst/>
+          </a:prstGeom>
+        </p:spPr>
+      </p:pic>
+    </p:spTree>
+    <p:extLst>
+      <p:ext uri="{BB962C8B-B14F-4D97-AF65-F5344CB8AC3E}">
+        <p14:creationId xmlns:p14="http://schemas.microsoft.com/office/powerpoint/2010/main" val="1169639936"/>
+      </p:ext>
+    </p:extLst>
+  </p:cSld>
+  <p:clrMapOvr>
+    <a:masterClrMapping/>
+  </p:clrMapOvr>
+</p:sld>
+</file>
+
+<file path=ppt/slides/slide13.xml><?xml version="1.0" encoding="utf-8"?>
+<p:sld xmlns:a="http://schemas.openxmlformats.org/drawingml/2006/main" xmlns:r="http://schemas.openxmlformats.org/officeDocument/2006/relationships" xmlns:p="http://schemas.openxmlformats.org/presentationml/2006/main">
+  <p:cSld>
+    <p:spTree>
+      <p:nvGrpSpPr>
+        <p:cNvPr id="1" name=""/>
+        <p:cNvGrpSpPr/>
+        <p:nvPr/>
+      </p:nvGrpSpPr>
+      <p:grpSpPr>
+        <a:xfrm>
+          <a:off x="0" y="0"/>
+          <a:ext cx="0" cy="0"/>
+          <a:chOff x="0" y="0"/>
+          <a:chExt cx="0" cy="0"/>
+        </a:xfrm>
+      </p:grpSpPr>
+      <p:sp>
+        <p:nvSpPr>
+          <p:cNvPr id="2" name="Title 1">
+            <a:extLst>
+              <a:ext uri="{FF2B5EF4-FFF2-40B4-BE49-F238E27FC236}">
+                <a16:creationId xmlns:a16="http://schemas.microsoft.com/office/drawing/2014/main" id="{DCCE38E0-42CB-6501-86CF-EE6AA01BCCC0}"/>
+              </a:ext>
+            </a:extLst>
+          </p:cNvPr>
+          <p:cNvSpPr>
+            <a:spLocks noGrp="1"/>
+          </p:cNvSpPr>
+          <p:nvPr>
+            <p:ph type="title"/>
+          </p:nvPr>
+        </p:nvSpPr>
         <p:spPr/>
         <p:txBody>
           <a:bodyPr/>
@@ -14137,20 +14273,1889 @@
           <a:p>
             <a:r>
               <a:rPr lang="en-US" dirty="0"/>
-              <a:t>Click on the following link to access the </a:t>
-            </a:r>
-            <a:r>
-              <a:rPr lang="fr-CA" dirty="0"/>
-              <a:t>Banque d’exercices:</a:t>
+              <a:t>Fork a GitHub repository</a:t>
             </a:r>
             <a:endParaRPr lang="en-CA" dirty="0"/>
+          </a:p>
+        </p:txBody>
+      </p:sp>
+      <p:sp>
+        <p:nvSpPr>
+          <p:cNvPr id="3" name="Content Placeholder 2">
+            <a:extLst>
+              <a:ext uri="{FF2B5EF4-FFF2-40B4-BE49-F238E27FC236}">
+                <a16:creationId xmlns:a16="http://schemas.microsoft.com/office/drawing/2014/main" id="{BE01B654-940D-17C8-B6CA-636367C424A2}"/>
+              </a:ext>
+            </a:extLst>
+          </p:cNvPr>
+          <p:cNvSpPr>
+            <a:spLocks noGrp="1"/>
+          </p:cNvSpPr>
+          <p:nvPr>
+            <p:ph idx="1"/>
+          </p:nvPr>
+        </p:nvSpPr>
+        <p:spPr>
+          <a:xfrm>
+            <a:off x="1174823" y="2509181"/>
+            <a:ext cx="9698576" cy="2197100"/>
+          </a:xfrm>
+        </p:spPr>
+        <p:txBody>
+          <a:bodyPr>
+            <a:normAutofit/>
+          </a:bodyPr>
+          <a:lstStyle/>
+          <a:p>
+            <a:r>
+              <a:rPr lang="en-US" sz="2400" dirty="0"/>
+              <a:t>You will need a (free!) GitHub account to fork the repo</a:t>
+            </a:r>
+          </a:p>
+          <a:p>
+            <a:r>
+              <a:rPr lang="en-US" sz="2400" dirty="0"/>
+              <a:t>You can create one easily with an email and a password</a:t>
+            </a:r>
+          </a:p>
+          <a:p>
+            <a:r>
+              <a:rPr lang="en-US" sz="2400" dirty="0"/>
+              <a:t>Once that is done, follow these steps to fork the repo:</a:t>
+            </a:r>
+          </a:p>
+          <a:p>
+            <a:pPr lvl="1"/>
+            <a:r>
+              <a:rPr lang="en-US" sz="2000" dirty="0"/>
+              <a:t>1) Click on the “Fork” icon on the top-right corner</a:t>
+            </a:r>
+            <a:endParaRPr lang="en-CA" sz="2000" dirty="0"/>
+          </a:p>
+        </p:txBody>
+      </p:sp>
+      <p:pic>
+        <p:nvPicPr>
+          <p:cNvPr id="5" name="Picture 4">
+            <a:extLst>
+              <a:ext uri="{FF2B5EF4-FFF2-40B4-BE49-F238E27FC236}">
+                <a16:creationId xmlns:a16="http://schemas.microsoft.com/office/drawing/2014/main" id="{AEF4FC33-DAF7-0B1A-52DB-91F5B4C5D899}"/>
+              </a:ext>
+            </a:extLst>
+          </p:cNvPr>
+          <p:cNvPicPr>
+            <a:picLocks noChangeAspect="1"/>
+          </p:cNvPicPr>
+          <p:nvPr/>
+        </p:nvPicPr>
+        <p:blipFill>
+          <a:blip r:embed="rId2"/>
+          <a:stretch>
+            <a:fillRect/>
+          </a:stretch>
+        </p:blipFill>
+        <p:spPr>
+          <a:xfrm>
+            <a:off x="2139523" y="4536191"/>
+            <a:ext cx="6792273" cy="1076475"/>
+          </a:xfrm>
+          <a:prstGeom prst="rect">
+            <a:avLst/>
+          </a:prstGeom>
+        </p:spPr>
+      </p:pic>
+      <p:sp>
+        <p:nvSpPr>
+          <p:cNvPr id="6" name="TextBox 5">
+            <a:extLst>
+              <a:ext uri="{FF2B5EF4-FFF2-40B4-BE49-F238E27FC236}">
+                <a16:creationId xmlns:a16="http://schemas.microsoft.com/office/drawing/2014/main" id="{AF6D28A2-18DC-C623-79A3-4B1C6C23F187}"/>
+              </a:ext>
+            </a:extLst>
+          </p:cNvPr>
+          <p:cNvSpPr txBox="1"/>
+          <p:nvPr/>
+        </p:nvSpPr>
+        <p:spPr>
+          <a:xfrm>
+            <a:off x="-685800" y="308113"/>
+            <a:ext cx="184731" cy="369332"/>
+          </a:xfrm>
+          <a:prstGeom prst="rect">
+            <a:avLst/>
+          </a:prstGeom>
+          <a:noFill/>
+        </p:spPr>
+        <p:txBody>
+          <a:bodyPr wrap="none" rtlCol="0">
+            <a:spAutoFit/>
+          </a:bodyPr>
+          <a:lstStyle/>
+          <a:p>
+            <a:endParaRPr lang="en-CA" dirty="0"/>
+          </a:p>
+        </p:txBody>
+      </p:sp>
+      <p:sp>
+        <p:nvSpPr>
+          <p:cNvPr id="7" name="Content Placeholder 2">
+            <a:extLst>
+              <a:ext uri="{FF2B5EF4-FFF2-40B4-BE49-F238E27FC236}">
+                <a16:creationId xmlns:a16="http://schemas.microsoft.com/office/drawing/2014/main" id="{FB90F8BD-A4EB-863E-2037-B5A6011F5FCF}"/>
+              </a:ext>
+            </a:extLst>
+          </p:cNvPr>
+          <p:cNvSpPr txBox="1">
+            <a:spLocks/>
+          </p:cNvSpPr>
+          <p:nvPr/>
+        </p:nvSpPr>
+        <p:spPr>
+          <a:xfrm>
+            <a:off x="1266581" y="5612666"/>
+            <a:ext cx="9658837" cy="945689"/>
+          </a:xfrm>
+          <a:prstGeom prst="rect">
+            <a:avLst/>
+          </a:prstGeom>
+        </p:spPr>
+        <p:txBody>
+          <a:bodyPr vert="horz" lIns="91440" tIns="45720" rIns="91440" bIns="45720" rtlCol="0">
+            <a:normAutofit/>
+          </a:bodyPr>
+          <a:lstStyle>
+            <a:lvl1pPr marL="342900" indent="-342900" algn="l" defTabSz="457200" rtl="0" eaLnBrk="1" latinLnBrk="0" hangingPunct="1">
+              <a:spcBef>
+                <a:spcPts val="1000"/>
+              </a:spcBef>
+              <a:spcAft>
+                <a:spcPts val="0"/>
+              </a:spcAft>
+              <a:buClr>
+                <a:schemeClr val="accent1"/>
+              </a:buClr>
+              <a:buSzPct val="80000"/>
+              <a:buFont typeface="Wingdings 3" charset="2"/>
+              <a:buChar char=""/>
+              <a:defRPr sz="1800" b="0" i="0" kern="1200">
+                <a:solidFill>
+                  <a:schemeClr val="tx1">
+                    <a:lumMod val="75000"/>
+                    <a:lumOff val="25000"/>
+                  </a:schemeClr>
+                </a:solidFill>
+                <a:latin typeface="+mn-lt"/>
+                <a:ea typeface="+mn-ea"/>
+                <a:cs typeface="+mn-cs"/>
+              </a:defRPr>
+            </a:lvl1pPr>
+            <a:lvl2pPr marL="742950" indent="-285750" algn="l" defTabSz="457200" rtl="0" eaLnBrk="1" latinLnBrk="0" hangingPunct="1">
+              <a:spcBef>
+                <a:spcPts val="1000"/>
+              </a:spcBef>
+              <a:spcAft>
+                <a:spcPts val="0"/>
+              </a:spcAft>
+              <a:buClr>
+                <a:schemeClr val="accent1"/>
+              </a:buClr>
+              <a:buSzPct val="80000"/>
+              <a:buFont typeface="Wingdings 3" charset="2"/>
+              <a:buChar char=""/>
+              <a:defRPr sz="1600" b="0" i="0" kern="1200">
+                <a:solidFill>
+                  <a:schemeClr val="tx1">
+                    <a:lumMod val="75000"/>
+                    <a:lumOff val="25000"/>
+                  </a:schemeClr>
+                </a:solidFill>
+                <a:latin typeface="+mn-lt"/>
+                <a:ea typeface="+mn-ea"/>
+                <a:cs typeface="+mn-cs"/>
+              </a:defRPr>
+            </a:lvl2pPr>
+            <a:lvl3pPr marL="1143000" indent="-228600" algn="l" defTabSz="457200" rtl="0" eaLnBrk="1" latinLnBrk="0" hangingPunct="1">
+              <a:spcBef>
+                <a:spcPts val="1000"/>
+              </a:spcBef>
+              <a:spcAft>
+                <a:spcPts val="0"/>
+              </a:spcAft>
+              <a:buClr>
+                <a:schemeClr val="accent1"/>
+              </a:buClr>
+              <a:buSzPct val="80000"/>
+              <a:buFont typeface="Wingdings 3" charset="2"/>
+              <a:buChar char=""/>
+              <a:defRPr sz="1400" b="0" i="0" kern="1200">
+                <a:solidFill>
+                  <a:schemeClr val="tx1">
+                    <a:lumMod val="75000"/>
+                    <a:lumOff val="25000"/>
+                  </a:schemeClr>
+                </a:solidFill>
+                <a:latin typeface="+mn-lt"/>
+                <a:ea typeface="+mn-ea"/>
+                <a:cs typeface="+mn-cs"/>
+              </a:defRPr>
+            </a:lvl3pPr>
+            <a:lvl4pPr marL="1600200" indent="-228600" algn="l" defTabSz="457200" rtl="0" eaLnBrk="1" latinLnBrk="0" hangingPunct="1">
+              <a:spcBef>
+                <a:spcPts val="1000"/>
+              </a:spcBef>
+              <a:spcAft>
+                <a:spcPts val="0"/>
+              </a:spcAft>
+              <a:buClr>
+                <a:schemeClr val="accent1"/>
+              </a:buClr>
+              <a:buSzPct val="80000"/>
+              <a:buFont typeface="Wingdings 3" charset="2"/>
+              <a:buChar char=""/>
+              <a:defRPr sz="1200" b="0" i="0" kern="1200">
+                <a:solidFill>
+                  <a:schemeClr val="tx1">
+                    <a:lumMod val="75000"/>
+                    <a:lumOff val="25000"/>
+                  </a:schemeClr>
+                </a:solidFill>
+                <a:latin typeface="+mn-lt"/>
+                <a:ea typeface="+mn-ea"/>
+                <a:cs typeface="+mn-cs"/>
+              </a:defRPr>
+            </a:lvl4pPr>
+            <a:lvl5pPr marL="2057400" indent="-228600" algn="l" defTabSz="457200" rtl="0" eaLnBrk="1" latinLnBrk="0" hangingPunct="1">
+              <a:spcBef>
+                <a:spcPts val="1000"/>
+              </a:spcBef>
+              <a:spcAft>
+                <a:spcPts val="0"/>
+              </a:spcAft>
+              <a:buClr>
+                <a:schemeClr val="accent1"/>
+              </a:buClr>
+              <a:buSzPct val="80000"/>
+              <a:buFont typeface="Wingdings 3" charset="2"/>
+              <a:buChar char=""/>
+              <a:defRPr sz="1200" b="0" i="0" kern="1200">
+                <a:solidFill>
+                  <a:schemeClr val="tx1">
+                    <a:lumMod val="75000"/>
+                    <a:lumOff val="25000"/>
+                  </a:schemeClr>
+                </a:solidFill>
+                <a:latin typeface="+mn-lt"/>
+                <a:ea typeface="+mn-ea"/>
+                <a:cs typeface="+mn-cs"/>
+              </a:defRPr>
+            </a:lvl5pPr>
+            <a:lvl6pPr marL="2514600" indent="-228600" algn="l" defTabSz="457200" rtl="0" eaLnBrk="1" latinLnBrk="0" hangingPunct="1">
+              <a:spcBef>
+                <a:spcPts val="1000"/>
+              </a:spcBef>
+              <a:spcAft>
+                <a:spcPts val="0"/>
+              </a:spcAft>
+              <a:buClr>
+                <a:schemeClr val="accent1"/>
+              </a:buClr>
+              <a:buSzPct val="80000"/>
+              <a:buFont typeface="Wingdings 3" charset="2"/>
+              <a:buChar char=""/>
+              <a:defRPr sz="1200" b="0" i="0" kern="1200">
+                <a:solidFill>
+                  <a:schemeClr val="tx1">
+                    <a:lumMod val="75000"/>
+                    <a:lumOff val="25000"/>
+                  </a:schemeClr>
+                </a:solidFill>
+                <a:latin typeface="+mn-lt"/>
+                <a:ea typeface="+mn-ea"/>
+                <a:cs typeface="+mn-cs"/>
+              </a:defRPr>
+            </a:lvl6pPr>
+            <a:lvl7pPr marL="2971800" indent="-228600" algn="l" defTabSz="457200" rtl="0" eaLnBrk="1" latinLnBrk="0" hangingPunct="1">
+              <a:spcBef>
+                <a:spcPts val="1000"/>
+              </a:spcBef>
+              <a:spcAft>
+                <a:spcPts val="0"/>
+              </a:spcAft>
+              <a:buClr>
+                <a:schemeClr val="accent1"/>
+              </a:buClr>
+              <a:buSzPct val="80000"/>
+              <a:buFont typeface="Wingdings 3" charset="2"/>
+              <a:buChar char=""/>
+              <a:defRPr sz="1200" b="0" i="0" kern="1200">
+                <a:solidFill>
+                  <a:schemeClr val="tx1">
+                    <a:lumMod val="75000"/>
+                    <a:lumOff val="25000"/>
+                  </a:schemeClr>
+                </a:solidFill>
+                <a:latin typeface="+mn-lt"/>
+                <a:ea typeface="+mn-ea"/>
+                <a:cs typeface="+mn-cs"/>
+              </a:defRPr>
+            </a:lvl7pPr>
+            <a:lvl8pPr marL="3429000" indent="-228600" algn="l" defTabSz="457200" rtl="0" eaLnBrk="1" latinLnBrk="0" hangingPunct="1">
+              <a:spcBef>
+                <a:spcPts val="1000"/>
+              </a:spcBef>
+              <a:spcAft>
+                <a:spcPts val="0"/>
+              </a:spcAft>
+              <a:buClr>
+                <a:schemeClr val="accent1"/>
+              </a:buClr>
+              <a:buSzPct val="80000"/>
+              <a:buFont typeface="Wingdings 3" charset="2"/>
+              <a:buChar char=""/>
+              <a:defRPr sz="1200" b="0" i="0" kern="1200">
+                <a:solidFill>
+                  <a:schemeClr val="tx1">
+                    <a:lumMod val="75000"/>
+                    <a:lumOff val="25000"/>
+                  </a:schemeClr>
+                </a:solidFill>
+                <a:latin typeface="+mn-lt"/>
+                <a:ea typeface="+mn-ea"/>
+                <a:cs typeface="+mn-cs"/>
+              </a:defRPr>
+            </a:lvl8pPr>
+            <a:lvl9pPr marL="3886200" indent="-228600" algn="l" defTabSz="457200" rtl="0" eaLnBrk="1" latinLnBrk="0" hangingPunct="1">
+              <a:spcBef>
+                <a:spcPts val="1000"/>
+              </a:spcBef>
+              <a:spcAft>
+                <a:spcPts val="0"/>
+              </a:spcAft>
+              <a:buClr>
+                <a:schemeClr val="accent1"/>
+              </a:buClr>
+              <a:buSzPct val="80000"/>
+              <a:buFont typeface="Wingdings 3" charset="2"/>
+              <a:buChar char=""/>
+              <a:defRPr sz="1200" b="0" i="0" kern="1200">
+                <a:solidFill>
+                  <a:schemeClr val="tx1">
+                    <a:lumMod val="75000"/>
+                    <a:lumOff val="25000"/>
+                  </a:schemeClr>
+                </a:solidFill>
+                <a:latin typeface="+mn-lt"/>
+                <a:ea typeface="+mn-ea"/>
+                <a:cs typeface="+mn-cs"/>
+              </a:defRPr>
+            </a:lvl9pPr>
+          </a:lstStyle>
+          <a:p>
+            <a:pPr lvl="1"/>
+            <a:r>
+              <a:rPr lang="en-US" sz="2000" dirty="0"/>
+              <a:t>2) Navigate to your copy of the repo in GitHub</a:t>
+            </a:r>
+          </a:p>
+          <a:p>
+            <a:pPr lvl="2"/>
+            <a:r>
+              <a:rPr lang="en-US" sz="1800" dirty="0"/>
+              <a:t>It should be named YOUR-USER-NAME/Intro-to-Python</a:t>
+            </a:r>
           </a:p>
         </p:txBody>
       </p:sp>
     </p:spTree>
     <p:extLst>
       <p:ext uri="{BB962C8B-B14F-4D97-AF65-F5344CB8AC3E}">
-        <p14:creationId xmlns:p14="http://schemas.microsoft.com/office/powerpoint/2010/main" val="1169639936"/>
+        <p14:creationId xmlns:p14="http://schemas.microsoft.com/office/powerpoint/2010/main" val="490339355"/>
+      </p:ext>
+    </p:extLst>
+  </p:cSld>
+  <p:clrMapOvr>
+    <a:masterClrMapping/>
+  </p:clrMapOvr>
+</p:sld>
+</file>
+
+<file path=ppt/slides/slide14.xml><?xml version="1.0" encoding="utf-8"?>
+<p:sld xmlns:a="http://schemas.openxmlformats.org/drawingml/2006/main" xmlns:r="http://schemas.openxmlformats.org/officeDocument/2006/relationships" xmlns:p="http://schemas.openxmlformats.org/presentationml/2006/main">
+  <p:cSld>
+    <p:spTree>
+      <p:nvGrpSpPr>
+        <p:cNvPr id="1" name=""/>
+        <p:cNvGrpSpPr/>
+        <p:nvPr/>
+      </p:nvGrpSpPr>
+      <p:grpSpPr>
+        <a:xfrm>
+          <a:off x="0" y="0"/>
+          <a:ext cx="0" cy="0"/>
+          <a:chOff x="0" y="0"/>
+          <a:chExt cx="0" cy="0"/>
+        </a:xfrm>
+      </p:grpSpPr>
+      <p:sp>
+        <p:nvSpPr>
+          <p:cNvPr id="2" name="Title 1">
+            <a:extLst>
+              <a:ext uri="{FF2B5EF4-FFF2-40B4-BE49-F238E27FC236}">
+                <a16:creationId xmlns:a16="http://schemas.microsoft.com/office/drawing/2014/main" id="{02E6E0C1-DDD9-80BE-BF13-E6650FD907EA}"/>
+              </a:ext>
+            </a:extLst>
+          </p:cNvPr>
+          <p:cNvSpPr>
+            <a:spLocks noGrp="1"/>
+          </p:cNvSpPr>
+          <p:nvPr>
+            <p:ph type="title"/>
+          </p:nvPr>
+        </p:nvSpPr>
+        <p:spPr/>
+        <p:txBody>
+          <a:bodyPr/>
+          <a:lstStyle/>
+          <a:p>
+            <a:r>
+              <a:rPr lang="en-US" dirty="0"/>
+              <a:t>Fork a GitHub repository (</a:t>
+            </a:r>
+            <a:r>
+              <a:rPr lang="en-US" dirty="0" err="1"/>
+              <a:t>cont</a:t>
+            </a:r>
+            <a:r>
+              <a:rPr lang="en-US" dirty="0"/>
+              <a:t>)</a:t>
+            </a:r>
+            <a:endParaRPr lang="en-CA" dirty="0"/>
+          </a:p>
+        </p:txBody>
+      </p:sp>
+      <p:sp>
+        <p:nvSpPr>
+          <p:cNvPr id="3" name="Content Placeholder 2">
+            <a:extLst>
+              <a:ext uri="{FF2B5EF4-FFF2-40B4-BE49-F238E27FC236}">
+                <a16:creationId xmlns:a16="http://schemas.microsoft.com/office/drawing/2014/main" id="{C52C763D-B6A9-F855-2F75-80B8204EAEEB}"/>
+              </a:ext>
+            </a:extLst>
+          </p:cNvPr>
+          <p:cNvSpPr>
+            <a:spLocks noGrp="1"/>
+          </p:cNvSpPr>
+          <p:nvPr>
+            <p:ph idx="1"/>
+          </p:nvPr>
+        </p:nvSpPr>
+        <p:spPr>
+          <a:xfrm>
+            <a:off x="724907" y="2474292"/>
+            <a:ext cx="10742185" cy="825500"/>
+          </a:xfrm>
+        </p:spPr>
+        <p:txBody>
+          <a:bodyPr>
+            <a:normAutofit/>
+          </a:bodyPr>
+          <a:lstStyle/>
+          <a:p>
+            <a:r>
+              <a:rPr lang="en-US" sz="2400" dirty="0"/>
+              <a:t>3) In your forked copy of the repo, click on the green “Code” icon</a:t>
+            </a:r>
+            <a:endParaRPr lang="en-CA" sz="2400" dirty="0"/>
+          </a:p>
+        </p:txBody>
+      </p:sp>
+      <p:pic>
+        <p:nvPicPr>
+          <p:cNvPr id="5" name="Picture 4">
+            <a:extLst>
+              <a:ext uri="{FF2B5EF4-FFF2-40B4-BE49-F238E27FC236}">
+                <a16:creationId xmlns:a16="http://schemas.microsoft.com/office/drawing/2014/main" id="{09D0099A-7F79-041D-EBE5-52D735A95679}"/>
+              </a:ext>
+            </a:extLst>
+          </p:cNvPr>
+          <p:cNvPicPr>
+            <a:picLocks noChangeAspect="1"/>
+          </p:cNvPicPr>
+          <p:nvPr/>
+        </p:nvPicPr>
+        <p:blipFill>
+          <a:blip r:embed="rId2"/>
+          <a:stretch>
+            <a:fillRect/>
+          </a:stretch>
+        </p:blipFill>
+        <p:spPr>
+          <a:xfrm>
+            <a:off x="3361089" y="2977695"/>
+            <a:ext cx="5469822" cy="902610"/>
+          </a:xfrm>
+          <a:prstGeom prst="rect">
+            <a:avLst/>
+          </a:prstGeom>
+        </p:spPr>
+      </p:pic>
+      <p:sp>
+        <p:nvSpPr>
+          <p:cNvPr id="6" name="Content Placeholder 2">
+            <a:extLst>
+              <a:ext uri="{FF2B5EF4-FFF2-40B4-BE49-F238E27FC236}">
+                <a16:creationId xmlns:a16="http://schemas.microsoft.com/office/drawing/2014/main" id="{2857E449-B855-77A6-7E16-3481DD987684}"/>
+              </a:ext>
+            </a:extLst>
+          </p:cNvPr>
+          <p:cNvSpPr txBox="1">
+            <a:spLocks/>
+          </p:cNvSpPr>
+          <p:nvPr/>
+        </p:nvSpPr>
+        <p:spPr>
+          <a:xfrm>
+            <a:off x="724907" y="4093452"/>
+            <a:ext cx="10742185" cy="825500"/>
+          </a:xfrm>
+          <a:prstGeom prst="rect">
+            <a:avLst/>
+          </a:prstGeom>
+        </p:spPr>
+        <p:txBody>
+          <a:bodyPr vert="horz" lIns="91440" tIns="45720" rIns="91440" bIns="45720" rtlCol="0">
+            <a:normAutofit/>
+          </a:bodyPr>
+          <a:lstStyle>
+            <a:lvl1pPr marL="342900" indent="-342900" algn="l" defTabSz="457200" rtl="0" eaLnBrk="1" latinLnBrk="0" hangingPunct="1">
+              <a:spcBef>
+                <a:spcPts val="1000"/>
+              </a:spcBef>
+              <a:spcAft>
+                <a:spcPts val="0"/>
+              </a:spcAft>
+              <a:buClr>
+                <a:schemeClr val="accent1"/>
+              </a:buClr>
+              <a:buSzPct val="80000"/>
+              <a:buFont typeface="Wingdings 3" charset="2"/>
+              <a:buChar char=""/>
+              <a:defRPr sz="1800" b="0" i="0" kern="1200">
+                <a:solidFill>
+                  <a:schemeClr val="tx1">
+                    <a:lumMod val="75000"/>
+                    <a:lumOff val="25000"/>
+                  </a:schemeClr>
+                </a:solidFill>
+                <a:latin typeface="+mn-lt"/>
+                <a:ea typeface="+mn-ea"/>
+                <a:cs typeface="+mn-cs"/>
+              </a:defRPr>
+            </a:lvl1pPr>
+            <a:lvl2pPr marL="742950" indent="-285750" algn="l" defTabSz="457200" rtl="0" eaLnBrk="1" latinLnBrk="0" hangingPunct="1">
+              <a:spcBef>
+                <a:spcPts val="1000"/>
+              </a:spcBef>
+              <a:spcAft>
+                <a:spcPts val="0"/>
+              </a:spcAft>
+              <a:buClr>
+                <a:schemeClr val="accent1"/>
+              </a:buClr>
+              <a:buSzPct val="80000"/>
+              <a:buFont typeface="Wingdings 3" charset="2"/>
+              <a:buChar char=""/>
+              <a:defRPr sz="1600" b="0" i="0" kern="1200">
+                <a:solidFill>
+                  <a:schemeClr val="tx1">
+                    <a:lumMod val="75000"/>
+                    <a:lumOff val="25000"/>
+                  </a:schemeClr>
+                </a:solidFill>
+                <a:latin typeface="+mn-lt"/>
+                <a:ea typeface="+mn-ea"/>
+                <a:cs typeface="+mn-cs"/>
+              </a:defRPr>
+            </a:lvl2pPr>
+            <a:lvl3pPr marL="1143000" indent="-228600" algn="l" defTabSz="457200" rtl="0" eaLnBrk="1" latinLnBrk="0" hangingPunct="1">
+              <a:spcBef>
+                <a:spcPts val="1000"/>
+              </a:spcBef>
+              <a:spcAft>
+                <a:spcPts val="0"/>
+              </a:spcAft>
+              <a:buClr>
+                <a:schemeClr val="accent1"/>
+              </a:buClr>
+              <a:buSzPct val="80000"/>
+              <a:buFont typeface="Wingdings 3" charset="2"/>
+              <a:buChar char=""/>
+              <a:defRPr sz="1400" b="0" i="0" kern="1200">
+                <a:solidFill>
+                  <a:schemeClr val="tx1">
+                    <a:lumMod val="75000"/>
+                    <a:lumOff val="25000"/>
+                  </a:schemeClr>
+                </a:solidFill>
+                <a:latin typeface="+mn-lt"/>
+                <a:ea typeface="+mn-ea"/>
+                <a:cs typeface="+mn-cs"/>
+              </a:defRPr>
+            </a:lvl3pPr>
+            <a:lvl4pPr marL="1600200" indent="-228600" algn="l" defTabSz="457200" rtl="0" eaLnBrk="1" latinLnBrk="0" hangingPunct="1">
+              <a:spcBef>
+                <a:spcPts val="1000"/>
+              </a:spcBef>
+              <a:spcAft>
+                <a:spcPts val="0"/>
+              </a:spcAft>
+              <a:buClr>
+                <a:schemeClr val="accent1"/>
+              </a:buClr>
+              <a:buSzPct val="80000"/>
+              <a:buFont typeface="Wingdings 3" charset="2"/>
+              <a:buChar char=""/>
+              <a:defRPr sz="1200" b="0" i="0" kern="1200">
+                <a:solidFill>
+                  <a:schemeClr val="tx1">
+                    <a:lumMod val="75000"/>
+                    <a:lumOff val="25000"/>
+                  </a:schemeClr>
+                </a:solidFill>
+                <a:latin typeface="+mn-lt"/>
+                <a:ea typeface="+mn-ea"/>
+                <a:cs typeface="+mn-cs"/>
+              </a:defRPr>
+            </a:lvl4pPr>
+            <a:lvl5pPr marL="2057400" indent="-228600" algn="l" defTabSz="457200" rtl="0" eaLnBrk="1" latinLnBrk="0" hangingPunct="1">
+              <a:spcBef>
+                <a:spcPts val="1000"/>
+              </a:spcBef>
+              <a:spcAft>
+                <a:spcPts val="0"/>
+              </a:spcAft>
+              <a:buClr>
+                <a:schemeClr val="accent1"/>
+              </a:buClr>
+              <a:buSzPct val="80000"/>
+              <a:buFont typeface="Wingdings 3" charset="2"/>
+              <a:buChar char=""/>
+              <a:defRPr sz="1200" b="0" i="0" kern="1200">
+                <a:solidFill>
+                  <a:schemeClr val="tx1">
+                    <a:lumMod val="75000"/>
+                    <a:lumOff val="25000"/>
+                  </a:schemeClr>
+                </a:solidFill>
+                <a:latin typeface="+mn-lt"/>
+                <a:ea typeface="+mn-ea"/>
+                <a:cs typeface="+mn-cs"/>
+              </a:defRPr>
+            </a:lvl5pPr>
+            <a:lvl6pPr marL="2514600" indent="-228600" algn="l" defTabSz="457200" rtl="0" eaLnBrk="1" latinLnBrk="0" hangingPunct="1">
+              <a:spcBef>
+                <a:spcPts val="1000"/>
+              </a:spcBef>
+              <a:spcAft>
+                <a:spcPts val="0"/>
+              </a:spcAft>
+              <a:buClr>
+                <a:schemeClr val="accent1"/>
+              </a:buClr>
+              <a:buSzPct val="80000"/>
+              <a:buFont typeface="Wingdings 3" charset="2"/>
+              <a:buChar char=""/>
+              <a:defRPr sz="1200" b="0" i="0" kern="1200">
+                <a:solidFill>
+                  <a:schemeClr val="tx1">
+                    <a:lumMod val="75000"/>
+                    <a:lumOff val="25000"/>
+                  </a:schemeClr>
+                </a:solidFill>
+                <a:latin typeface="+mn-lt"/>
+                <a:ea typeface="+mn-ea"/>
+                <a:cs typeface="+mn-cs"/>
+              </a:defRPr>
+            </a:lvl6pPr>
+            <a:lvl7pPr marL="2971800" indent="-228600" algn="l" defTabSz="457200" rtl="0" eaLnBrk="1" latinLnBrk="0" hangingPunct="1">
+              <a:spcBef>
+                <a:spcPts val="1000"/>
+              </a:spcBef>
+              <a:spcAft>
+                <a:spcPts val="0"/>
+              </a:spcAft>
+              <a:buClr>
+                <a:schemeClr val="accent1"/>
+              </a:buClr>
+              <a:buSzPct val="80000"/>
+              <a:buFont typeface="Wingdings 3" charset="2"/>
+              <a:buChar char=""/>
+              <a:defRPr sz="1200" b="0" i="0" kern="1200">
+                <a:solidFill>
+                  <a:schemeClr val="tx1">
+                    <a:lumMod val="75000"/>
+                    <a:lumOff val="25000"/>
+                  </a:schemeClr>
+                </a:solidFill>
+                <a:latin typeface="+mn-lt"/>
+                <a:ea typeface="+mn-ea"/>
+                <a:cs typeface="+mn-cs"/>
+              </a:defRPr>
+            </a:lvl7pPr>
+            <a:lvl8pPr marL="3429000" indent="-228600" algn="l" defTabSz="457200" rtl="0" eaLnBrk="1" latinLnBrk="0" hangingPunct="1">
+              <a:spcBef>
+                <a:spcPts val="1000"/>
+              </a:spcBef>
+              <a:spcAft>
+                <a:spcPts val="0"/>
+              </a:spcAft>
+              <a:buClr>
+                <a:schemeClr val="accent1"/>
+              </a:buClr>
+              <a:buSzPct val="80000"/>
+              <a:buFont typeface="Wingdings 3" charset="2"/>
+              <a:buChar char=""/>
+              <a:defRPr sz="1200" b="0" i="0" kern="1200">
+                <a:solidFill>
+                  <a:schemeClr val="tx1">
+                    <a:lumMod val="75000"/>
+                    <a:lumOff val="25000"/>
+                  </a:schemeClr>
+                </a:solidFill>
+                <a:latin typeface="+mn-lt"/>
+                <a:ea typeface="+mn-ea"/>
+                <a:cs typeface="+mn-cs"/>
+              </a:defRPr>
+            </a:lvl8pPr>
+            <a:lvl9pPr marL="3886200" indent="-228600" algn="l" defTabSz="457200" rtl="0" eaLnBrk="1" latinLnBrk="0" hangingPunct="1">
+              <a:spcBef>
+                <a:spcPts val="1000"/>
+              </a:spcBef>
+              <a:spcAft>
+                <a:spcPts val="0"/>
+              </a:spcAft>
+              <a:buClr>
+                <a:schemeClr val="accent1"/>
+              </a:buClr>
+              <a:buSzPct val="80000"/>
+              <a:buFont typeface="Wingdings 3" charset="2"/>
+              <a:buChar char=""/>
+              <a:defRPr sz="1200" b="0" i="0" kern="1200">
+                <a:solidFill>
+                  <a:schemeClr val="tx1">
+                    <a:lumMod val="75000"/>
+                    <a:lumOff val="25000"/>
+                  </a:schemeClr>
+                </a:solidFill>
+                <a:latin typeface="+mn-lt"/>
+                <a:ea typeface="+mn-ea"/>
+                <a:cs typeface="+mn-cs"/>
+              </a:defRPr>
+            </a:lvl9pPr>
+          </a:lstStyle>
+          <a:p>
+            <a:r>
+              <a:rPr lang="en-US" sz="2400" dirty="0"/>
+              <a:t>4) Click on this icon to “clone” the repo</a:t>
+            </a:r>
+            <a:endParaRPr lang="en-CA" sz="2400" dirty="0"/>
+          </a:p>
+        </p:txBody>
+      </p:sp>
+      <p:pic>
+        <p:nvPicPr>
+          <p:cNvPr id="9" name="Picture 8">
+            <a:extLst>
+              <a:ext uri="{FF2B5EF4-FFF2-40B4-BE49-F238E27FC236}">
+                <a16:creationId xmlns:a16="http://schemas.microsoft.com/office/drawing/2014/main" id="{B51E315B-E3DE-A06E-78BB-89D4A0005F97}"/>
+              </a:ext>
+            </a:extLst>
+          </p:cNvPr>
+          <p:cNvPicPr>
+            <a:picLocks noChangeAspect="1"/>
+          </p:cNvPicPr>
+          <p:nvPr/>
+        </p:nvPicPr>
+        <p:blipFill>
+          <a:blip r:embed="rId3"/>
+          <a:stretch>
+            <a:fillRect/>
+          </a:stretch>
+        </p:blipFill>
+        <p:spPr>
+          <a:xfrm>
+            <a:off x="3789792" y="4622253"/>
+            <a:ext cx="4612415" cy="2003753"/>
+          </a:xfrm>
+          <a:prstGeom prst="rect">
+            <a:avLst/>
+          </a:prstGeom>
+        </p:spPr>
+      </p:pic>
+      <p:sp>
+        <p:nvSpPr>
+          <p:cNvPr id="10" name="Rectangle 9">
+            <a:extLst>
+              <a:ext uri="{FF2B5EF4-FFF2-40B4-BE49-F238E27FC236}">
+                <a16:creationId xmlns:a16="http://schemas.microsoft.com/office/drawing/2014/main" id="{417CDCFD-1A56-9C80-2BB7-05BA73592F7F}"/>
+              </a:ext>
+            </a:extLst>
+          </p:cNvPr>
+          <p:cNvSpPr/>
+          <p:nvPr/>
+        </p:nvSpPr>
+        <p:spPr>
+          <a:xfrm>
+            <a:off x="7593496" y="5784574"/>
+            <a:ext cx="808712" cy="477078"/>
+          </a:xfrm>
+          <a:prstGeom prst="rect">
+            <a:avLst/>
+          </a:prstGeom>
+          <a:noFill/>
+          <a:ln w="63500">
+            <a:solidFill>
+              <a:srgbClr val="FF0000"/>
+            </a:solidFill>
+          </a:ln>
+        </p:spPr>
+        <p:style>
+          <a:lnRef idx="2">
+            <a:schemeClr val="accent1">
+              <a:shade val="50000"/>
+            </a:schemeClr>
+          </a:lnRef>
+          <a:fillRef idx="1">
+            <a:schemeClr val="accent1"/>
+          </a:fillRef>
+          <a:effectRef idx="0">
+            <a:schemeClr val="accent1"/>
+          </a:effectRef>
+          <a:fontRef idx="minor">
+            <a:schemeClr val="lt1"/>
+          </a:fontRef>
+        </p:style>
+        <p:txBody>
+          <a:bodyPr rtlCol="0" anchor="ctr"/>
+          <a:lstStyle/>
+          <a:p>
+            <a:pPr algn="ctr"/>
+            <a:endParaRPr lang="en-CA"/>
+          </a:p>
+        </p:txBody>
+      </p:sp>
+    </p:spTree>
+    <p:extLst>
+      <p:ext uri="{BB962C8B-B14F-4D97-AF65-F5344CB8AC3E}">
+        <p14:creationId xmlns:p14="http://schemas.microsoft.com/office/powerpoint/2010/main" val="2932823093"/>
+      </p:ext>
+    </p:extLst>
+  </p:cSld>
+  <p:clrMapOvr>
+    <a:masterClrMapping/>
+  </p:clrMapOvr>
+</p:sld>
+</file>
+
+<file path=ppt/slides/slide15.xml><?xml version="1.0" encoding="utf-8"?>
+<p:sld xmlns:a="http://schemas.openxmlformats.org/drawingml/2006/main" xmlns:r="http://schemas.openxmlformats.org/officeDocument/2006/relationships" xmlns:p="http://schemas.openxmlformats.org/presentationml/2006/main">
+  <p:cSld>
+    <p:spTree>
+      <p:nvGrpSpPr>
+        <p:cNvPr id="1" name=""/>
+        <p:cNvGrpSpPr/>
+        <p:nvPr/>
+      </p:nvGrpSpPr>
+      <p:grpSpPr>
+        <a:xfrm>
+          <a:off x="0" y="0"/>
+          <a:ext cx="0" cy="0"/>
+          <a:chOff x="0" y="0"/>
+          <a:chExt cx="0" cy="0"/>
+        </a:xfrm>
+      </p:grpSpPr>
+      <p:sp>
+        <p:nvSpPr>
+          <p:cNvPr id="2" name="Title 1">
+            <a:extLst>
+              <a:ext uri="{FF2B5EF4-FFF2-40B4-BE49-F238E27FC236}">
+                <a16:creationId xmlns:a16="http://schemas.microsoft.com/office/drawing/2014/main" id="{3625A222-452A-B9EE-B750-D0FFC788CF42}"/>
+              </a:ext>
+            </a:extLst>
+          </p:cNvPr>
+          <p:cNvSpPr>
+            <a:spLocks noGrp="1"/>
+          </p:cNvSpPr>
+          <p:nvPr>
+            <p:ph type="title"/>
+          </p:nvPr>
+        </p:nvSpPr>
+        <p:spPr/>
+        <p:txBody>
+          <a:bodyPr/>
+          <a:lstStyle/>
+          <a:p>
+            <a:r>
+              <a:rPr lang="en-US" dirty="0"/>
+              <a:t>Clone a GitHub Repository</a:t>
+            </a:r>
+            <a:endParaRPr lang="en-CA" dirty="0"/>
+          </a:p>
+        </p:txBody>
+      </p:sp>
+      <p:sp>
+        <p:nvSpPr>
+          <p:cNvPr id="3" name="Content Placeholder 2">
+            <a:extLst>
+              <a:ext uri="{FF2B5EF4-FFF2-40B4-BE49-F238E27FC236}">
+                <a16:creationId xmlns:a16="http://schemas.microsoft.com/office/drawing/2014/main" id="{5E7340EC-AD29-7760-3280-C602DB539C02}"/>
+              </a:ext>
+            </a:extLst>
+          </p:cNvPr>
+          <p:cNvSpPr>
+            <a:spLocks noGrp="1"/>
+          </p:cNvSpPr>
+          <p:nvPr>
+            <p:ph idx="1"/>
+          </p:nvPr>
+        </p:nvSpPr>
+        <p:spPr>
+          <a:xfrm>
+            <a:off x="1154955" y="2603499"/>
+            <a:ext cx="9638942" cy="1362213"/>
+          </a:xfrm>
+        </p:spPr>
+        <p:txBody>
+          <a:bodyPr>
+            <a:normAutofit/>
+          </a:bodyPr>
+          <a:lstStyle/>
+          <a:p>
+            <a:r>
+              <a:rPr lang="en-US" sz="2400" dirty="0"/>
+              <a:t>5) Open up the File Explorer and navigate to where you would like the files to be</a:t>
+            </a:r>
+          </a:p>
+          <a:p>
+            <a:pPr lvl="1"/>
+            <a:r>
+              <a:rPr lang="en-US" sz="2000" dirty="0"/>
+              <a:t>For example:</a:t>
+            </a:r>
+            <a:endParaRPr lang="en-CA" sz="2000" dirty="0"/>
+          </a:p>
+        </p:txBody>
+      </p:sp>
+      <p:pic>
+        <p:nvPicPr>
+          <p:cNvPr id="5" name="Picture 4">
+            <a:extLst>
+              <a:ext uri="{FF2B5EF4-FFF2-40B4-BE49-F238E27FC236}">
+                <a16:creationId xmlns:a16="http://schemas.microsoft.com/office/drawing/2014/main" id="{685F03C4-AAEE-A5D2-2DD4-D17530B2B07A}"/>
+              </a:ext>
+            </a:extLst>
+          </p:cNvPr>
+          <p:cNvPicPr>
+            <a:picLocks noChangeAspect="1"/>
+          </p:cNvPicPr>
+          <p:nvPr/>
+        </p:nvPicPr>
+        <p:blipFill>
+          <a:blip r:embed="rId2"/>
+          <a:stretch>
+            <a:fillRect/>
+          </a:stretch>
+        </p:blipFill>
+        <p:spPr>
+          <a:xfrm>
+            <a:off x="788905" y="3965712"/>
+            <a:ext cx="5922919" cy="695817"/>
+          </a:xfrm>
+          <a:prstGeom prst="rect">
+            <a:avLst/>
+          </a:prstGeom>
+        </p:spPr>
+      </p:pic>
+      <p:sp>
+        <p:nvSpPr>
+          <p:cNvPr id="6" name="Content Placeholder 2">
+            <a:extLst>
+              <a:ext uri="{FF2B5EF4-FFF2-40B4-BE49-F238E27FC236}">
+                <a16:creationId xmlns:a16="http://schemas.microsoft.com/office/drawing/2014/main" id="{AEE10B8B-38C2-487D-E9FD-FC52F9E57FDC}"/>
+              </a:ext>
+            </a:extLst>
+          </p:cNvPr>
+          <p:cNvSpPr txBox="1">
+            <a:spLocks/>
+          </p:cNvSpPr>
+          <p:nvPr/>
+        </p:nvSpPr>
+        <p:spPr>
+          <a:xfrm>
+            <a:off x="1276528" y="4803359"/>
+            <a:ext cx="4100542" cy="1362213"/>
+          </a:xfrm>
+          <a:prstGeom prst="rect">
+            <a:avLst/>
+          </a:prstGeom>
+        </p:spPr>
+        <p:txBody>
+          <a:bodyPr vert="horz" lIns="91440" tIns="45720" rIns="91440" bIns="45720" rtlCol="0">
+            <a:normAutofit/>
+          </a:bodyPr>
+          <a:lstStyle>
+            <a:lvl1pPr marL="342900" indent="-342900" algn="l" defTabSz="457200" rtl="0" eaLnBrk="1" latinLnBrk="0" hangingPunct="1">
+              <a:spcBef>
+                <a:spcPts val="1000"/>
+              </a:spcBef>
+              <a:spcAft>
+                <a:spcPts val="0"/>
+              </a:spcAft>
+              <a:buClr>
+                <a:schemeClr val="accent1"/>
+              </a:buClr>
+              <a:buSzPct val="80000"/>
+              <a:buFont typeface="Wingdings 3" charset="2"/>
+              <a:buChar char=""/>
+              <a:defRPr sz="1800" b="0" i="0" kern="1200">
+                <a:solidFill>
+                  <a:schemeClr val="tx1">
+                    <a:lumMod val="75000"/>
+                    <a:lumOff val="25000"/>
+                  </a:schemeClr>
+                </a:solidFill>
+                <a:latin typeface="+mn-lt"/>
+                <a:ea typeface="+mn-ea"/>
+                <a:cs typeface="+mn-cs"/>
+              </a:defRPr>
+            </a:lvl1pPr>
+            <a:lvl2pPr marL="742950" indent="-285750" algn="l" defTabSz="457200" rtl="0" eaLnBrk="1" latinLnBrk="0" hangingPunct="1">
+              <a:spcBef>
+                <a:spcPts val="1000"/>
+              </a:spcBef>
+              <a:spcAft>
+                <a:spcPts val="0"/>
+              </a:spcAft>
+              <a:buClr>
+                <a:schemeClr val="accent1"/>
+              </a:buClr>
+              <a:buSzPct val="80000"/>
+              <a:buFont typeface="Wingdings 3" charset="2"/>
+              <a:buChar char=""/>
+              <a:defRPr sz="1600" b="0" i="0" kern="1200">
+                <a:solidFill>
+                  <a:schemeClr val="tx1">
+                    <a:lumMod val="75000"/>
+                    <a:lumOff val="25000"/>
+                  </a:schemeClr>
+                </a:solidFill>
+                <a:latin typeface="+mn-lt"/>
+                <a:ea typeface="+mn-ea"/>
+                <a:cs typeface="+mn-cs"/>
+              </a:defRPr>
+            </a:lvl2pPr>
+            <a:lvl3pPr marL="1143000" indent="-228600" algn="l" defTabSz="457200" rtl="0" eaLnBrk="1" latinLnBrk="0" hangingPunct="1">
+              <a:spcBef>
+                <a:spcPts val="1000"/>
+              </a:spcBef>
+              <a:spcAft>
+                <a:spcPts val="0"/>
+              </a:spcAft>
+              <a:buClr>
+                <a:schemeClr val="accent1"/>
+              </a:buClr>
+              <a:buSzPct val="80000"/>
+              <a:buFont typeface="Wingdings 3" charset="2"/>
+              <a:buChar char=""/>
+              <a:defRPr sz="1400" b="0" i="0" kern="1200">
+                <a:solidFill>
+                  <a:schemeClr val="tx1">
+                    <a:lumMod val="75000"/>
+                    <a:lumOff val="25000"/>
+                  </a:schemeClr>
+                </a:solidFill>
+                <a:latin typeface="+mn-lt"/>
+                <a:ea typeface="+mn-ea"/>
+                <a:cs typeface="+mn-cs"/>
+              </a:defRPr>
+            </a:lvl3pPr>
+            <a:lvl4pPr marL="1600200" indent="-228600" algn="l" defTabSz="457200" rtl="0" eaLnBrk="1" latinLnBrk="0" hangingPunct="1">
+              <a:spcBef>
+                <a:spcPts val="1000"/>
+              </a:spcBef>
+              <a:spcAft>
+                <a:spcPts val="0"/>
+              </a:spcAft>
+              <a:buClr>
+                <a:schemeClr val="accent1"/>
+              </a:buClr>
+              <a:buSzPct val="80000"/>
+              <a:buFont typeface="Wingdings 3" charset="2"/>
+              <a:buChar char=""/>
+              <a:defRPr sz="1200" b="0" i="0" kern="1200">
+                <a:solidFill>
+                  <a:schemeClr val="tx1">
+                    <a:lumMod val="75000"/>
+                    <a:lumOff val="25000"/>
+                  </a:schemeClr>
+                </a:solidFill>
+                <a:latin typeface="+mn-lt"/>
+                <a:ea typeface="+mn-ea"/>
+                <a:cs typeface="+mn-cs"/>
+              </a:defRPr>
+            </a:lvl4pPr>
+            <a:lvl5pPr marL="2057400" indent="-228600" algn="l" defTabSz="457200" rtl="0" eaLnBrk="1" latinLnBrk="0" hangingPunct="1">
+              <a:spcBef>
+                <a:spcPts val="1000"/>
+              </a:spcBef>
+              <a:spcAft>
+                <a:spcPts val="0"/>
+              </a:spcAft>
+              <a:buClr>
+                <a:schemeClr val="accent1"/>
+              </a:buClr>
+              <a:buSzPct val="80000"/>
+              <a:buFont typeface="Wingdings 3" charset="2"/>
+              <a:buChar char=""/>
+              <a:defRPr sz="1200" b="0" i="0" kern="1200">
+                <a:solidFill>
+                  <a:schemeClr val="tx1">
+                    <a:lumMod val="75000"/>
+                    <a:lumOff val="25000"/>
+                  </a:schemeClr>
+                </a:solidFill>
+                <a:latin typeface="+mn-lt"/>
+                <a:ea typeface="+mn-ea"/>
+                <a:cs typeface="+mn-cs"/>
+              </a:defRPr>
+            </a:lvl5pPr>
+            <a:lvl6pPr marL="2514600" indent="-228600" algn="l" defTabSz="457200" rtl="0" eaLnBrk="1" latinLnBrk="0" hangingPunct="1">
+              <a:spcBef>
+                <a:spcPts val="1000"/>
+              </a:spcBef>
+              <a:spcAft>
+                <a:spcPts val="0"/>
+              </a:spcAft>
+              <a:buClr>
+                <a:schemeClr val="accent1"/>
+              </a:buClr>
+              <a:buSzPct val="80000"/>
+              <a:buFont typeface="Wingdings 3" charset="2"/>
+              <a:buChar char=""/>
+              <a:defRPr sz="1200" b="0" i="0" kern="1200">
+                <a:solidFill>
+                  <a:schemeClr val="tx1">
+                    <a:lumMod val="75000"/>
+                    <a:lumOff val="25000"/>
+                  </a:schemeClr>
+                </a:solidFill>
+                <a:latin typeface="+mn-lt"/>
+                <a:ea typeface="+mn-ea"/>
+                <a:cs typeface="+mn-cs"/>
+              </a:defRPr>
+            </a:lvl6pPr>
+            <a:lvl7pPr marL="2971800" indent="-228600" algn="l" defTabSz="457200" rtl="0" eaLnBrk="1" latinLnBrk="0" hangingPunct="1">
+              <a:spcBef>
+                <a:spcPts val="1000"/>
+              </a:spcBef>
+              <a:spcAft>
+                <a:spcPts val="0"/>
+              </a:spcAft>
+              <a:buClr>
+                <a:schemeClr val="accent1"/>
+              </a:buClr>
+              <a:buSzPct val="80000"/>
+              <a:buFont typeface="Wingdings 3" charset="2"/>
+              <a:buChar char=""/>
+              <a:defRPr sz="1200" b="0" i="0" kern="1200">
+                <a:solidFill>
+                  <a:schemeClr val="tx1">
+                    <a:lumMod val="75000"/>
+                    <a:lumOff val="25000"/>
+                  </a:schemeClr>
+                </a:solidFill>
+                <a:latin typeface="+mn-lt"/>
+                <a:ea typeface="+mn-ea"/>
+                <a:cs typeface="+mn-cs"/>
+              </a:defRPr>
+            </a:lvl7pPr>
+            <a:lvl8pPr marL="3429000" indent="-228600" algn="l" defTabSz="457200" rtl="0" eaLnBrk="1" latinLnBrk="0" hangingPunct="1">
+              <a:spcBef>
+                <a:spcPts val="1000"/>
+              </a:spcBef>
+              <a:spcAft>
+                <a:spcPts val="0"/>
+              </a:spcAft>
+              <a:buClr>
+                <a:schemeClr val="accent1"/>
+              </a:buClr>
+              <a:buSzPct val="80000"/>
+              <a:buFont typeface="Wingdings 3" charset="2"/>
+              <a:buChar char=""/>
+              <a:defRPr sz="1200" b="0" i="0" kern="1200">
+                <a:solidFill>
+                  <a:schemeClr val="tx1">
+                    <a:lumMod val="75000"/>
+                    <a:lumOff val="25000"/>
+                  </a:schemeClr>
+                </a:solidFill>
+                <a:latin typeface="+mn-lt"/>
+                <a:ea typeface="+mn-ea"/>
+                <a:cs typeface="+mn-cs"/>
+              </a:defRPr>
+            </a:lvl8pPr>
+            <a:lvl9pPr marL="3886200" indent="-228600" algn="l" defTabSz="457200" rtl="0" eaLnBrk="1" latinLnBrk="0" hangingPunct="1">
+              <a:spcBef>
+                <a:spcPts val="1000"/>
+              </a:spcBef>
+              <a:spcAft>
+                <a:spcPts val="0"/>
+              </a:spcAft>
+              <a:buClr>
+                <a:schemeClr val="accent1"/>
+              </a:buClr>
+              <a:buSzPct val="80000"/>
+              <a:buFont typeface="Wingdings 3" charset="2"/>
+              <a:buChar char=""/>
+              <a:defRPr sz="1200" b="0" i="0" kern="1200">
+                <a:solidFill>
+                  <a:schemeClr val="tx1">
+                    <a:lumMod val="75000"/>
+                    <a:lumOff val="25000"/>
+                  </a:schemeClr>
+                </a:solidFill>
+                <a:latin typeface="+mn-lt"/>
+                <a:ea typeface="+mn-ea"/>
+                <a:cs typeface="+mn-cs"/>
+              </a:defRPr>
+            </a:lvl9pPr>
+          </a:lstStyle>
+          <a:p>
+            <a:r>
+              <a:rPr lang="en-US" sz="2400" dirty="0"/>
+              <a:t>6) Right click and select “Git bash here”</a:t>
+            </a:r>
+            <a:endParaRPr lang="en-CA" sz="2000" dirty="0"/>
+          </a:p>
+        </p:txBody>
+      </p:sp>
+      <p:pic>
+        <p:nvPicPr>
+          <p:cNvPr id="8" name="Picture 7">
+            <a:extLst>
+              <a:ext uri="{FF2B5EF4-FFF2-40B4-BE49-F238E27FC236}">
+                <a16:creationId xmlns:a16="http://schemas.microsoft.com/office/drawing/2014/main" id="{9CE93141-BEF5-3D4C-BAA2-CF4C79B6A008}"/>
+              </a:ext>
+            </a:extLst>
+          </p:cNvPr>
+          <p:cNvPicPr>
+            <a:picLocks noChangeAspect="1"/>
+          </p:cNvPicPr>
+          <p:nvPr/>
+        </p:nvPicPr>
+        <p:blipFill>
+          <a:blip r:embed="rId3"/>
+          <a:stretch>
+            <a:fillRect/>
+          </a:stretch>
+        </p:blipFill>
+        <p:spPr>
+          <a:xfrm>
+            <a:off x="7569191" y="3285435"/>
+            <a:ext cx="3224706" cy="3289852"/>
+          </a:xfrm>
+          <a:prstGeom prst="rect">
+            <a:avLst/>
+          </a:prstGeom>
+        </p:spPr>
+      </p:pic>
+      <p:sp>
+        <p:nvSpPr>
+          <p:cNvPr id="9" name="Rectangle 8">
+            <a:extLst>
+              <a:ext uri="{FF2B5EF4-FFF2-40B4-BE49-F238E27FC236}">
+                <a16:creationId xmlns:a16="http://schemas.microsoft.com/office/drawing/2014/main" id="{C0FA089B-113C-D3C7-6858-8987E13B6BCF}"/>
+              </a:ext>
+            </a:extLst>
+          </p:cNvPr>
+          <p:cNvSpPr/>
+          <p:nvPr/>
+        </p:nvSpPr>
+        <p:spPr>
+          <a:xfrm>
+            <a:off x="7569191" y="5237922"/>
+            <a:ext cx="1147426" cy="208721"/>
+          </a:xfrm>
+          <a:prstGeom prst="rect">
+            <a:avLst/>
+          </a:prstGeom>
+          <a:noFill/>
+          <a:ln w="38100">
+            <a:solidFill>
+              <a:srgbClr val="FF0000"/>
+            </a:solidFill>
+          </a:ln>
+        </p:spPr>
+        <p:style>
+          <a:lnRef idx="2">
+            <a:schemeClr val="accent1">
+              <a:shade val="50000"/>
+            </a:schemeClr>
+          </a:lnRef>
+          <a:fillRef idx="1">
+            <a:schemeClr val="accent1"/>
+          </a:fillRef>
+          <a:effectRef idx="0">
+            <a:schemeClr val="accent1"/>
+          </a:effectRef>
+          <a:fontRef idx="minor">
+            <a:schemeClr val="lt1"/>
+          </a:fontRef>
+        </p:style>
+        <p:txBody>
+          <a:bodyPr rtlCol="0" anchor="ctr"/>
+          <a:lstStyle/>
+          <a:p>
+            <a:pPr algn="ctr"/>
+            <a:endParaRPr lang="en-CA"/>
+          </a:p>
+        </p:txBody>
+      </p:sp>
+    </p:spTree>
+    <p:extLst>
+      <p:ext uri="{BB962C8B-B14F-4D97-AF65-F5344CB8AC3E}">
+        <p14:creationId xmlns:p14="http://schemas.microsoft.com/office/powerpoint/2010/main" val="2590543833"/>
+      </p:ext>
+    </p:extLst>
+  </p:cSld>
+  <p:clrMapOvr>
+    <a:masterClrMapping/>
+  </p:clrMapOvr>
+</p:sld>
+</file>
+
+<file path=ppt/slides/slide16.xml><?xml version="1.0" encoding="utf-8"?>
+<p:sld xmlns:a="http://schemas.openxmlformats.org/drawingml/2006/main" xmlns:r="http://schemas.openxmlformats.org/officeDocument/2006/relationships" xmlns:p="http://schemas.openxmlformats.org/presentationml/2006/main">
+  <p:cSld>
+    <p:spTree>
+      <p:nvGrpSpPr>
+        <p:cNvPr id="1" name=""/>
+        <p:cNvGrpSpPr/>
+        <p:nvPr/>
+      </p:nvGrpSpPr>
+      <p:grpSpPr>
+        <a:xfrm>
+          <a:off x="0" y="0"/>
+          <a:ext cx="0" cy="0"/>
+          <a:chOff x="0" y="0"/>
+          <a:chExt cx="0" cy="0"/>
+        </a:xfrm>
+      </p:grpSpPr>
+      <p:sp>
+        <p:nvSpPr>
+          <p:cNvPr id="2" name="Title 1">
+            <a:extLst>
+              <a:ext uri="{FF2B5EF4-FFF2-40B4-BE49-F238E27FC236}">
+                <a16:creationId xmlns:a16="http://schemas.microsoft.com/office/drawing/2014/main" id="{36237C2D-B162-C314-4DAB-C0D110BB7D3F}"/>
+              </a:ext>
+            </a:extLst>
+          </p:cNvPr>
+          <p:cNvSpPr>
+            <a:spLocks noGrp="1"/>
+          </p:cNvSpPr>
+          <p:nvPr>
+            <p:ph type="title"/>
+          </p:nvPr>
+        </p:nvSpPr>
+        <p:spPr/>
+        <p:txBody>
+          <a:bodyPr/>
+          <a:lstStyle/>
+          <a:p>
+            <a:r>
+              <a:rPr lang="en-US" dirty="0"/>
+              <a:t>Clone a GitHub Repository (</a:t>
+            </a:r>
+            <a:r>
+              <a:rPr lang="en-US" dirty="0" err="1"/>
+              <a:t>cont</a:t>
+            </a:r>
+            <a:r>
+              <a:rPr lang="en-US" dirty="0"/>
+              <a:t>)</a:t>
+            </a:r>
+            <a:endParaRPr lang="en-CA" dirty="0"/>
+          </a:p>
+        </p:txBody>
+      </p:sp>
+      <p:sp>
+        <p:nvSpPr>
+          <p:cNvPr id="3" name="Content Placeholder 2">
+            <a:extLst>
+              <a:ext uri="{FF2B5EF4-FFF2-40B4-BE49-F238E27FC236}">
+                <a16:creationId xmlns:a16="http://schemas.microsoft.com/office/drawing/2014/main" id="{2B009AA5-3979-259D-265A-F8673BC0918C}"/>
+              </a:ext>
+            </a:extLst>
+          </p:cNvPr>
+          <p:cNvSpPr>
+            <a:spLocks noGrp="1"/>
+          </p:cNvSpPr>
+          <p:nvPr>
+            <p:ph idx="1"/>
+          </p:nvPr>
+        </p:nvSpPr>
+        <p:spPr>
+          <a:xfrm>
+            <a:off x="1154954" y="2444473"/>
+            <a:ext cx="10076263" cy="2892840"/>
+          </a:xfrm>
+        </p:spPr>
+        <p:txBody>
+          <a:bodyPr>
+            <a:normAutofit/>
+          </a:bodyPr>
+          <a:lstStyle/>
+          <a:p>
+            <a:r>
+              <a:rPr lang="en-US" sz="2400" dirty="0"/>
+              <a:t>7) Type in the following</a:t>
+            </a:r>
+          </a:p>
+          <a:p>
+            <a:pPr lvl="1"/>
+            <a:r>
+              <a:rPr lang="en-US" sz="2000" dirty="0"/>
+              <a:t>git clone link-to-repo</a:t>
+            </a:r>
+          </a:p>
+          <a:p>
+            <a:pPr lvl="1"/>
+            <a:r>
+              <a:rPr lang="en-US" sz="2000" dirty="0"/>
+              <a:t>Replace the “link-to-repo” with the link you copied in Step 4</a:t>
+            </a:r>
+          </a:p>
+          <a:p>
+            <a:pPr lvl="2"/>
+            <a:r>
+              <a:rPr lang="en-US" sz="1800" dirty="0"/>
+              <a:t>It should still be in your copied, so you should be able to simply right click and paste it!</a:t>
+            </a:r>
+          </a:p>
+          <a:p>
+            <a:r>
+              <a:rPr lang="en-US" sz="2400" dirty="0"/>
+              <a:t>8) Finally, you can open your cloned repo directly in the file explorer and access all the exercises!</a:t>
+            </a:r>
+            <a:endParaRPr lang="en-CA" sz="2400" dirty="0"/>
+          </a:p>
+        </p:txBody>
+      </p:sp>
+      <p:pic>
+        <p:nvPicPr>
+          <p:cNvPr id="5" name="Picture 4">
+            <a:extLst>
+              <a:ext uri="{FF2B5EF4-FFF2-40B4-BE49-F238E27FC236}">
+                <a16:creationId xmlns:a16="http://schemas.microsoft.com/office/drawing/2014/main" id="{D7A832E7-5BFF-C4F2-F5EE-9B46438D0C32}"/>
+              </a:ext>
+            </a:extLst>
+          </p:cNvPr>
+          <p:cNvPicPr>
+            <a:picLocks noChangeAspect="1"/>
+          </p:cNvPicPr>
+          <p:nvPr/>
+        </p:nvPicPr>
+        <p:blipFill>
+          <a:blip r:embed="rId2"/>
+          <a:stretch>
+            <a:fillRect/>
+          </a:stretch>
+        </p:blipFill>
+        <p:spPr>
+          <a:xfrm>
+            <a:off x="2078034" y="5636203"/>
+            <a:ext cx="8035932" cy="683612"/>
+          </a:xfrm>
+          <a:prstGeom prst="rect">
+            <a:avLst/>
+          </a:prstGeom>
+        </p:spPr>
+      </p:pic>
+    </p:spTree>
+    <p:extLst>
+      <p:ext uri="{BB962C8B-B14F-4D97-AF65-F5344CB8AC3E}">
+        <p14:creationId xmlns:p14="http://schemas.microsoft.com/office/powerpoint/2010/main" val="4011837418"/>
+      </p:ext>
+    </p:extLst>
+  </p:cSld>
+  <p:clrMapOvr>
+    <a:masterClrMapping/>
+  </p:clrMapOvr>
+</p:sld>
+</file>
+
+<file path=ppt/slides/slide17.xml><?xml version="1.0" encoding="utf-8"?>
+<p:sld xmlns:a="http://schemas.openxmlformats.org/drawingml/2006/main" xmlns:r="http://schemas.openxmlformats.org/officeDocument/2006/relationships" xmlns:p="http://schemas.openxmlformats.org/presentationml/2006/main">
+  <p:cSld>
+    <p:spTree>
+      <p:nvGrpSpPr>
+        <p:cNvPr id="1" name=""/>
+        <p:cNvGrpSpPr/>
+        <p:nvPr/>
+      </p:nvGrpSpPr>
+      <p:grpSpPr>
+        <a:xfrm>
+          <a:off x="0" y="0"/>
+          <a:ext cx="0" cy="0"/>
+          <a:chOff x="0" y="0"/>
+          <a:chExt cx="0" cy="0"/>
+        </a:xfrm>
+      </p:grpSpPr>
+      <p:sp>
+        <p:nvSpPr>
+          <p:cNvPr id="2" name="Title 1">
+            <a:extLst>
+              <a:ext uri="{FF2B5EF4-FFF2-40B4-BE49-F238E27FC236}">
+                <a16:creationId xmlns:a16="http://schemas.microsoft.com/office/drawing/2014/main" id="{AA59B4F7-7861-C675-2657-CAE5AF8009F8}"/>
+              </a:ext>
+            </a:extLst>
+          </p:cNvPr>
+          <p:cNvSpPr>
+            <a:spLocks noGrp="1"/>
+          </p:cNvSpPr>
+          <p:nvPr>
+            <p:ph type="title"/>
+          </p:nvPr>
+        </p:nvSpPr>
+        <p:spPr/>
+        <p:txBody>
+          <a:bodyPr/>
+          <a:lstStyle/>
+          <a:p>
+            <a:r>
+              <a:rPr lang="en-US" dirty="0"/>
+              <a:t>Okay, but why not use the F drive?</a:t>
+            </a:r>
+            <a:endParaRPr lang="en-CA" dirty="0"/>
+          </a:p>
+        </p:txBody>
+      </p:sp>
+      <p:sp>
+        <p:nvSpPr>
+          <p:cNvPr id="3" name="Content Placeholder 2">
+            <a:extLst>
+              <a:ext uri="{FF2B5EF4-FFF2-40B4-BE49-F238E27FC236}">
+                <a16:creationId xmlns:a16="http://schemas.microsoft.com/office/drawing/2014/main" id="{4C08915A-5F85-A37C-92E5-BC378B6A3C59}"/>
+              </a:ext>
+            </a:extLst>
+          </p:cNvPr>
+          <p:cNvSpPr>
+            <a:spLocks noGrp="1"/>
+          </p:cNvSpPr>
+          <p:nvPr>
+            <p:ph idx="1"/>
+          </p:nvPr>
+        </p:nvSpPr>
+        <p:spPr>
+          <a:xfrm>
+            <a:off x="1154954" y="2603500"/>
+            <a:ext cx="10016629" cy="3687970"/>
+          </a:xfrm>
+        </p:spPr>
+        <p:txBody>
+          <a:bodyPr>
+            <a:normAutofit/>
+          </a:bodyPr>
+          <a:lstStyle/>
+          <a:p>
+            <a:pPr>
+              <a:lnSpc>
+                <a:spcPct val="150000"/>
+              </a:lnSpc>
+            </a:pPr>
+            <a:r>
+              <a:rPr lang="en-US" sz="2400" dirty="0"/>
+              <a:t>It’s true, I could’ve simply put all these exercises in the F drive and you could’ve easily accessed them this way</a:t>
+            </a:r>
+          </a:p>
+          <a:p>
+            <a:pPr>
+              <a:lnSpc>
+                <a:spcPct val="150000"/>
+              </a:lnSpc>
+            </a:pPr>
+            <a:r>
+              <a:rPr lang="en-US" sz="2400" dirty="0"/>
+              <a:t>The advantage with GitHub is that you can freely modify the code you forked, and I (or anyone else!) can access </a:t>
+            </a:r>
+            <a:r>
+              <a:rPr lang="en-US" sz="2400" b="1" dirty="0"/>
+              <a:t>your version </a:t>
+            </a:r>
+            <a:r>
+              <a:rPr lang="en-US" sz="2400" dirty="0"/>
+              <a:t>of the code and help with writing, testing, debugging, etc. </a:t>
+            </a:r>
+            <a:r>
+              <a:rPr lang="en-US" sz="2400" b="1" dirty="0"/>
+              <a:t>without affecting the “main” code</a:t>
+            </a:r>
+          </a:p>
+        </p:txBody>
+      </p:sp>
+    </p:spTree>
+    <p:extLst>
+      <p:ext uri="{BB962C8B-B14F-4D97-AF65-F5344CB8AC3E}">
+        <p14:creationId xmlns:p14="http://schemas.microsoft.com/office/powerpoint/2010/main" val="1849516680"/>
+      </p:ext>
+    </p:extLst>
+  </p:cSld>
+  <p:clrMapOvr>
+    <a:masterClrMapping/>
+  </p:clrMapOvr>
+</p:sld>
+</file>
+
+<file path=ppt/slides/slide18.xml><?xml version="1.0" encoding="utf-8"?>
+<p:sld xmlns:a="http://schemas.openxmlformats.org/drawingml/2006/main" xmlns:r="http://schemas.openxmlformats.org/officeDocument/2006/relationships" xmlns:p="http://schemas.openxmlformats.org/presentationml/2006/main">
+  <p:cSld>
+    <p:spTree>
+      <p:nvGrpSpPr>
+        <p:cNvPr id="1" name=""/>
+        <p:cNvGrpSpPr/>
+        <p:nvPr/>
+      </p:nvGrpSpPr>
+      <p:grpSpPr>
+        <a:xfrm>
+          <a:off x="0" y="0"/>
+          <a:ext cx="0" cy="0"/>
+          <a:chOff x="0" y="0"/>
+          <a:chExt cx="0" cy="0"/>
+        </a:xfrm>
+      </p:grpSpPr>
+      <p:sp>
+        <p:nvSpPr>
+          <p:cNvPr id="2" name="Title 1">
+            <a:extLst>
+              <a:ext uri="{FF2B5EF4-FFF2-40B4-BE49-F238E27FC236}">
+                <a16:creationId xmlns:a16="http://schemas.microsoft.com/office/drawing/2014/main" id="{62B09352-DDBD-C9E4-E8B1-1BC6D15F77D9}"/>
+              </a:ext>
+            </a:extLst>
+          </p:cNvPr>
+          <p:cNvSpPr>
+            <a:spLocks noGrp="1"/>
+          </p:cNvSpPr>
+          <p:nvPr>
+            <p:ph type="title"/>
+          </p:nvPr>
+        </p:nvSpPr>
+        <p:spPr/>
+        <p:txBody>
+          <a:bodyPr/>
+          <a:lstStyle/>
+          <a:p>
+            <a:r>
+              <a:rPr lang="en-US" dirty="0"/>
+              <a:t>Finally, let’s write our first program!</a:t>
+            </a:r>
+            <a:endParaRPr lang="en-CA" dirty="0"/>
+          </a:p>
+        </p:txBody>
+      </p:sp>
+      <p:sp>
+        <p:nvSpPr>
+          <p:cNvPr id="3" name="Content Placeholder 2">
+            <a:extLst>
+              <a:ext uri="{FF2B5EF4-FFF2-40B4-BE49-F238E27FC236}">
+                <a16:creationId xmlns:a16="http://schemas.microsoft.com/office/drawing/2014/main" id="{D2B47AE1-6328-1ED5-A1F5-032976FF9874}"/>
+              </a:ext>
+            </a:extLst>
+          </p:cNvPr>
+          <p:cNvSpPr>
+            <a:spLocks noGrp="1"/>
+          </p:cNvSpPr>
+          <p:nvPr>
+            <p:ph idx="1"/>
+          </p:nvPr>
+        </p:nvSpPr>
+        <p:spPr>
+          <a:xfrm>
+            <a:off x="1154954" y="2603500"/>
+            <a:ext cx="10235289" cy="3416300"/>
+          </a:xfrm>
+        </p:spPr>
+        <p:txBody>
+          <a:bodyPr>
+            <a:normAutofit/>
+          </a:bodyPr>
+          <a:lstStyle/>
+          <a:p>
+            <a:r>
+              <a:rPr lang="en-US" sz="2800" dirty="0"/>
+              <a:t>Open up the Windows Command Prompt</a:t>
+            </a:r>
+          </a:p>
+          <a:p>
+            <a:r>
+              <a:rPr lang="en-US" sz="2800" dirty="0"/>
+              <a:t>Type in</a:t>
+            </a:r>
+            <a:r>
+              <a:rPr lang="en-CA" sz="2800" dirty="0"/>
+              <a:t> the following</a:t>
+            </a:r>
+          </a:p>
+          <a:p>
+            <a:pPr lvl="1"/>
+            <a:r>
+              <a:rPr lang="en-CA" sz="2400" dirty="0" err="1"/>
+              <a:t>jupyter</a:t>
+            </a:r>
+            <a:r>
+              <a:rPr lang="en-CA" sz="2400" dirty="0"/>
+              <a:t> notebook</a:t>
+            </a:r>
+          </a:p>
+          <a:p>
+            <a:r>
+              <a:rPr lang="en-CA" sz="2800" dirty="0"/>
+              <a:t>Navigate to your cloned Intro-to-Python repo</a:t>
+            </a:r>
+          </a:p>
+          <a:p>
+            <a:r>
+              <a:rPr lang="en-CA" sz="2800" dirty="0"/>
+              <a:t>Open up the Exercises folder and click on Week1.ipynb</a:t>
+            </a:r>
+            <a:endParaRPr lang="en-US" sz="2800" dirty="0"/>
+          </a:p>
+        </p:txBody>
+      </p:sp>
+    </p:spTree>
+    <p:extLst>
+      <p:ext uri="{BB962C8B-B14F-4D97-AF65-F5344CB8AC3E}">
+        <p14:creationId xmlns:p14="http://schemas.microsoft.com/office/powerpoint/2010/main" val="577431846"/>
+      </p:ext>
+    </p:extLst>
+  </p:cSld>
+  <p:clrMapOvr>
+    <a:masterClrMapping/>
+  </p:clrMapOvr>
+</p:sld>
+</file>
+
+<file path=ppt/slides/slide19.xml><?xml version="1.0" encoding="utf-8"?>
+<p:sld xmlns:a="http://schemas.openxmlformats.org/drawingml/2006/main" xmlns:r="http://schemas.openxmlformats.org/officeDocument/2006/relationships" xmlns:p="http://schemas.openxmlformats.org/presentationml/2006/main">
+  <p:cSld>
+    <p:spTree>
+      <p:nvGrpSpPr>
+        <p:cNvPr id="1" name=""/>
+        <p:cNvGrpSpPr/>
+        <p:nvPr/>
+      </p:nvGrpSpPr>
+      <p:grpSpPr>
+        <a:xfrm>
+          <a:off x="0" y="0"/>
+          <a:ext cx="0" cy="0"/>
+          <a:chOff x="0" y="0"/>
+          <a:chExt cx="0" cy="0"/>
+        </a:xfrm>
+      </p:grpSpPr>
+      <p:sp>
+        <p:nvSpPr>
+          <p:cNvPr id="2" name="Title 1">
+            <a:extLst>
+              <a:ext uri="{FF2B5EF4-FFF2-40B4-BE49-F238E27FC236}">
+                <a16:creationId xmlns:a16="http://schemas.microsoft.com/office/drawing/2014/main" id="{9308070F-BD25-A8E3-F6CB-08DDED378E80}"/>
+              </a:ext>
+            </a:extLst>
+          </p:cNvPr>
+          <p:cNvSpPr>
+            <a:spLocks noGrp="1"/>
+          </p:cNvSpPr>
+          <p:nvPr>
+            <p:ph type="title"/>
+          </p:nvPr>
+        </p:nvSpPr>
+        <p:spPr/>
+        <p:txBody>
+          <a:bodyPr/>
+          <a:lstStyle/>
+          <a:p>
+            <a:r>
+              <a:rPr lang="en-US" dirty="0"/>
+              <a:t>Hello World</a:t>
+            </a:r>
+            <a:endParaRPr lang="en-CA" dirty="0"/>
+          </a:p>
+        </p:txBody>
+      </p:sp>
+      <p:sp>
+        <p:nvSpPr>
+          <p:cNvPr id="3" name="Content Placeholder 2">
+            <a:extLst>
+              <a:ext uri="{FF2B5EF4-FFF2-40B4-BE49-F238E27FC236}">
+                <a16:creationId xmlns:a16="http://schemas.microsoft.com/office/drawing/2014/main" id="{B172465F-8357-18C2-3569-29D9428D234F}"/>
+              </a:ext>
+            </a:extLst>
+          </p:cNvPr>
+          <p:cNvSpPr>
+            <a:spLocks noGrp="1"/>
+          </p:cNvSpPr>
+          <p:nvPr>
+            <p:ph idx="1"/>
+          </p:nvPr>
+        </p:nvSpPr>
+        <p:spPr>
+          <a:xfrm>
+            <a:off x="1154954" y="2603500"/>
+            <a:ext cx="9579307" cy="3416300"/>
+          </a:xfrm>
+        </p:spPr>
+        <p:txBody>
+          <a:bodyPr>
+            <a:normAutofit/>
+          </a:bodyPr>
+          <a:lstStyle/>
+          <a:p>
+            <a:r>
+              <a:rPr lang="en-US" sz="2400" dirty="0"/>
+              <a:t>The first Python functionality we will learn is the “print” statement</a:t>
+            </a:r>
+          </a:p>
+          <a:p>
+            <a:r>
+              <a:rPr lang="en-US" sz="2400" dirty="0"/>
+              <a:t>As the name suggests, it allows the user to “print” a piece of information on the screen</a:t>
+            </a:r>
+          </a:p>
+          <a:p>
+            <a:r>
+              <a:rPr lang="en-US" sz="2400" dirty="0"/>
+              <a:t>Exercise 1: print out Hello World using the following syntax:</a:t>
+            </a:r>
+          </a:p>
+          <a:p>
+            <a:pPr lvl="1"/>
+            <a:r>
+              <a:rPr lang="en-US" sz="2000" dirty="0"/>
+              <a:t>print(“Hello World”)</a:t>
+            </a:r>
+          </a:p>
+          <a:p>
+            <a:pPr lvl="1"/>
+            <a:r>
+              <a:rPr lang="en-US" sz="2000" dirty="0"/>
+              <a:t>Quotes are important!</a:t>
+            </a:r>
+            <a:endParaRPr lang="en-CA" sz="2000" dirty="0"/>
+          </a:p>
+        </p:txBody>
+      </p:sp>
+    </p:spTree>
+    <p:extLst>
+      <p:ext uri="{BB962C8B-B14F-4D97-AF65-F5344CB8AC3E}">
+        <p14:creationId xmlns:p14="http://schemas.microsoft.com/office/powerpoint/2010/main" val="4261117256"/>
       </p:ext>
     </p:extLst>
   </p:cSld>
@@ -14287,6 +16292,457 @@
     <p:extLst>
       <p:ext uri="{BB962C8B-B14F-4D97-AF65-F5344CB8AC3E}">
         <p14:creationId xmlns:p14="http://schemas.microsoft.com/office/powerpoint/2010/main" val="3028199120"/>
+      </p:ext>
+    </p:extLst>
+  </p:cSld>
+  <p:clrMapOvr>
+    <a:masterClrMapping/>
+  </p:clrMapOvr>
+</p:sld>
+</file>
+
+<file path=ppt/slides/slide20.xml><?xml version="1.0" encoding="utf-8"?>
+<p:sld xmlns:a="http://schemas.openxmlformats.org/drawingml/2006/main" xmlns:r="http://schemas.openxmlformats.org/officeDocument/2006/relationships" xmlns:p="http://schemas.openxmlformats.org/presentationml/2006/main">
+  <p:cSld>
+    <p:spTree>
+      <p:nvGrpSpPr>
+        <p:cNvPr id="1" name=""/>
+        <p:cNvGrpSpPr/>
+        <p:nvPr/>
+      </p:nvGrpSpPr>
+      <p:grpSpPr>
+        <a:xfrm>
+          <a:off x="0" y="0"/>
+          <a:ext cx="0" cy="0"/>
+          <a:chOff x="0" y="0"/>
+          <a:chExt cx="0" cy="0"/>
+        </a:xfrm>
+      </p:grpSpPr>
+      <p:sp>
+        <p:nvSpPr>
+          <p:cNvPr id="2" name="Title 1">
+            <a:extLst>
+              <a:ext uri="{FF2B5EF4-FFF2-40B4-BE49-F238E27FC236}">
+                <a16:creationId xmlns:a16="http://schemas.microsoft.com/office/drawing/2014/main" id="{502F6D6B-4216-2788-7B3A-DB8A998504DE}"/>
+              </a:ext>
+            </a:extLst>
+          </p:cNvPr>
+          <p:cNvSpPr>
+            <a:spLocks noGrp="1"/>
+          </p:cNvSpPr>
+          <p:nvPr>
+            <p:ph type="title"/>
+          </p:nvPr>
+        </p:nvSpPr>
+        <p:spPr/>
+        <p:txBody>
+          <a:bodyPr/>
+          <a:lstStyle/>
+          <a:p>
+            <a:r>
+              <a:rPr lang="en-US" dirty="0"/>
+              <a:t>Math functionalities</a:t>
+            </a:r>
+            <a:endParaRPr lang="en-CA" dirty="0"/>
+          </a:p>
+        </p:txBody>
+      </p:sp>
+      <p:sp>
+        <p:nvSpPr>
+          <p:cNvPr id="3" name="Content Placeholder 2">
+            <a:extLst>
+              <a:ext uri="{FF2B5EF4-FFF2-40B4-BE49-F238E27FC236}">
+                <a16:creationId xmlns:a16="http://schemas.microsoft.com/office/drawing/2014/main" id="{3C306A79-DA45-37AD-68DD-E50B333AA935}"/>
+              </a:ext>
+            </a:extLst>
+          </p:cNvPr>
+          <p:cNvSpPr>
+            <a:spLocks noGrp="1"/>
+          </p:cNvSpPr>
+          <p:nvPr>
+            <p:ph idx="1"/>
+          </p:nvPr>
+        </p:nvSpPr>
+        <p:spPr>
+          <a:xfrm>
+            <a:off x="974035" y="2454965"/>
+            <a:ext cx="10386391" cy="4283765"/>
+          </a:xfrm>
+        </p:spPr>
+        <p:txBody>
+          <a:bodyPr>
+            <a:normAutofit fontScale="92500"/>
+          </a:bodyPr>
+          <a:lstStyle/>
+          <a:p>
+            <a:r>
+              <a:rPr lang="en-US" sz="2400" dirty="0"/>
+              <a:t>The second Python functionality we will learn relates to mathematical operations</a:t>
+            </a:r>
+          </a:p>
+          <a:p>
+            <a:r>
+              <a:rPr lang="en-US" sz="2400" dirty="0"/>
+              <a:t>Math is super easy in Python!</a:t>
+            </a:r>
+          </a:p>
+          <a:p>
+            <a:r>
+              <a:rPr lang="en-US" sz="2400" dirty="0"/>
+              <a:t>Add numbers using +, subtract using -, multiply using *, and divide using /</a:t>
+            </a:r>
+          </a:p>
+          <a:p>
+            <a:r>
+              <a:rPr lang="en-US" sz="2400" dirty="0"/>
+              <a:t>Let’s write a code that adds two numbers, a and b, using the following syntax</a:t>
+            </a:r>
+          </a:p>
+          <a:p>
+            <a:pPr lvl="1"/>
+            <a:r>
+              <a:rPr lang="en-US" sz="2000" dirty="0"/>
+              <a:t>a = 1</a:t>
+            </a:r>
+          </a:p>
+          <a:p>
+            <a:pPr lvl="1"/>
+            <a:r>
+              <a:rPr lang="en-US" sz="2000" dirty="0"/>
+              <a:t>b = 2</a:t>
+            </a:r>
+          </a:p>
+          <a:p>
+            <a:pPr lvl="1"/>
+            <a:r>
+              <a:rPr lang="en-US" sz="2000" dirty="0"/>
+              <a:t>print(</a:t>
+            </a:r>
+            <a:r>
+              <a:rPr lang="en-US" sz="2000" dirty="0" err="1"/>
+              <a:t>a+b</a:t>
+            </a:r>
+            <a:r>
+              <a:rPr lang="en-US" sz="2000" dirty="0"/>
+              <a:t>)</a:t>
+            </a:r>
+          </a:p>
+          <a:p>
+            <a:r>
+              <a:rPr lang="en-US" sz="2400" dirty="0"/>
+              <a:t>Notice the lack of quotation marks this time</a:t>
+            </a:r>
+            <a:endParaRPr lang="en-CA" sz="2400" dirty="0"/>
+          </a:p>
+        </p:txBody>
+      </p:sp>
+    </p:spTree>
+    <p:extLst>
+      <p:ext uri="{BB962C8B-B14F-4D97-AF65-F5344CB8AC3E}">
+        <p14:creationId xmlns:p14="http://schemas.microsoft.com/office/powerpoint/2010/main" val="2844420776"/>
+      </p:ext>
+    </p:extLst>
+  </p:cSld>
+  <p:clrMapOvr>
+    <a:masterClrMapping/>
+  </p:clrMapOvr>
+</p:sld>
+</file>
+
+<file path=ppt/slides/slide21.xml><?xml version="1.0" encoding="utf-8"?>
+<p:sld xmlns:a="http://schemas.openxmlformats.org/drawingml/2006/main" xmlns:r="http://schemas.openxmlformats.org/officeDocument/2006/relationships" xmlns:p="http://schemas.openxmlformats.org/presentationml/2006/main">
+  <p:cSld>
+    <p:spTree>
+      <p:nvGrpSpPr>
+        <p:cNvPr id="1" name=""/>
+        <p:cNvGrpSpPr/>
+        <p:nvPr/>
+      </p:nvGrpSpPr>
+      <p:grpSpPr>
+        <a:xfrm>
+          <a:off x="0" y="0"/>
+          <a:ext cx="0" cy="0"/>
+          <a:chOff x="0" y="0"/>
+          <a:chExt cx="0" cy="0"/>
+        </a:xfrm>
+      </p:grpSpPr>
+      <p:sp>
+        <p:nvSpPr>
+          <p:cNvPr id="2" name="Title 1">
+            <a:extLst>
+              <a:ext uri="{FF2B5EF4-FFF2-40B4-BE49-F238E27FC236}">
+                <a16:creationId xmlns:a16="http://schemas.microsoft.com/office/drawing/2014/main" id="{55AC0F8C-8EE3-198B-FDE2-3C75AC7E864C}"/>
+              </a:ext>
+            </a:extLst>
+          </p:cNvPr>
+          <p:cNvSpPr>
+            <a:spLocks noGrp="1"/>
+          </p:cNvSpPr>
+          <p:nvPr>
+            <p:ph type="title"/>
+          </p:nvPr>
+        </p:nvSpPr>
+        <p:spPr/>
+        <p:txBody>
+          <a:bodyPr/>
+          <a:lstStyle/>
+          <a:p>
+            <a:r>
+              <a:rPr lang="en-US" dirty="0"/>
+              <a:t>Python Objects</a:t>
+            </a:r>
+            <a:endParaRPr lang="en-CA" dirty="0"/>
+          </a:p>
+        </p:txBody>
+      </p:sp>
+      <p:sp>
+        <p:nvSpPr>
+          <p:cNvPr id="3" name="Content Placeholder 2">
+            <a:extLst>
+              <a:ext uri="{FF2B5EF4-FFF2-40B4-BE49-F238E27FC236}">
+                <a16:creationId xmlns:a16="http://schemas.microsoft.com/office/drawing/2014/main" id="{87908A5F-C3AC-24EB-FB29-4632646000A9}"/>
+              </a:ext>
+            </a:extLst>
+          </p:cNvPr>
+          <p:cNvSpPr>
+            <a:spLocks noGrp="1"/>
+          </p:cNvSpPr>
+          <p:nvPr>
+            <p:ph idx="1"/>
+          </p:nvPr>
+        </p:nvSpPr>
+        <p:spPr>
+          <a:xfrm>
+            <a:off x="1349740" y="2355573"/>
+            <a:ext cx="9492519" cy="4502427"/>
+          </a:xfrm>
+        </p:spPr>
+        <p:txBody>
+          <a:bodyPr>
+            <a:normAutofit lnSpcReduction="10000"/>
+          </a:bodyPr>
+          <a:lstStyle/>
+          <a:p>
+            <a:r>
+              <a:rPr lang="en-US" sz="2000" dirty="0"/>
+              <a:t>Python classifies different bits of text into different objects</a:t>
+            </a:r>
+          </a:p>
+          <a:p>
+            <a:r>
+              <a:rPr lang="en-US" sz="2000" dirty="0"/>
+              <a:t>These include…</a:t>
+            </a:r>
+          </a:p>
+          <a:p>
+            <a:pPr lvl="1"/>
+            <a:r>
+              <a:rPr lang="en-US" sz="1800" dirty="0"/>
+              <a:t>Strings </a:t>
+            </a:r>
+          </a:p>
+          <a:p>
+            <a:pPr lvl="2"/>
+            <a:r>
+              <a:rPr lang="en-US" sz="1600" dirty="0"/>
+              <a:t>These are any pieces of text enclosed in quotations marks</a:t>
+            </a:r>
+          </a:p>
+          <a:p>
+            <a:pPr lvl="2"/>
+            <a:r>
+              <a:rPr lang="en-US" sz="1600" dirty="0"/>
+              <a:t>E.g. “Hello World” is a string object</a:t>
+            </a:r>
+          </a:p>
+          <a:p>
+            <a:pPr lvl="2"/>
+            <a:r>
+              <a:rPr lang="en-US" sz="1600" dirty="0"/>
+              <a:t>Used to represent exactly what is enclosed in the quotation marks</a:t>
+            </a:r>
+          </a:p>
+          <a:p>
+            <a:pPr lvl="1"/>
+            <a:r>
+              <a:rPr lang="en-US" sz="1800" dirty="0"/>
+              <a:t>Integers</a:t>
+            </a:r>
+          </a:p>
+          <a:p>
+            <a:pPr lvl="2"/>
+            <a:r>
+              <a:rPr lang="en-US" sz="1600" dirty="0"/>
+              <a:t>Round numbers with no decimals</a:t>
+            </a:r>
+          </a:p>
+          <a:p>
+            <a:pPr lvl="2"/>
+            <a:r>
+              <a:rPr lang="en-US" sz="1600" dirty="0"/>
+              <a:t>E.g. 1, 2, 3, …</a:t>
+            </a:r>
+          </a:p>
+          <a:p>
+            <a:pPr lvl="1"/>
+            <a:r>
+              <a:rPr lang="en-CA" sz="1800" dirty="0"/>
+              <a:t>Floats</a:t>
+            </a:r>
+          </a:p>
+          <a:p>
+            <a:pPr lvl="2"/>
+            <a:r>
+              <a:rPr lang="en-CA" sz="1600" dirty="0"/>
+              <a:t>Floating point numbers are numbers with decimal places</a:t>
+            </a:r>
+          </a:p>
+          <a:p>
+            <a:pPr lvl="2"/>
+            <a:r>
+              <a:rPr lang="en-CA" sz="1600" dirty="0"/>
+              <a:t>E.g. 3.1415, </a:t>
+            </a:r>
+            <a:r>
+              <a:rPr lang="en-CA" sz="1600" dirty="0" err="1"/>
+              <a:t>etc</a:t>
+            </a:r>
+            <a:endParaRPr lang="en-CA" sz="1600" dirty="0"/>
+          </a:p>
+        </p:txBody>
+      </p:sp>
+    </p:spTree>
+    <p:extLst>
+      <p:ext uri="{BB962C8B-B14F-4D97-AF65-F5344CB8AC3E}">
+        <p14:creationId xmlns:p14="http://schemas.microsoft.com/office/powerpoint/2010/main" val="4170095980"/>
+      </p:ext>
+    </p:extLst>
+  </p:cSld>
+  <p:clrMapOvr>
+    <a:masterClrMapping/>
+  </p:clrMapOvr>
+</p:sld>
+</file>
+
+<file path=ppt/slides/slide22.xml><?xml version="1.0" encoding="utf-8"?>
+<p:sld xmlns:a="http://schemas.openxmlformats.org/drawingml/2006/main" xmlns:r="http://schemas.openxmlformats.org/officeDocument/2006/relationships" xmlns:p="http://schemas.openxmlformats.org/presentationml/2006/main">
+  <p:cSld>
+    <p:spTree>
+      <p:nvGrpSpPr>
+        <p:cNvPr id="1" name=""/>
+        <p:cNvGrpSpPr/>
+        <p:nvPr/>
+      </p:nvGrpSpPr>
+      <p:grpSpPr>
+        <a:xfrm>
+          <a:off x="0" y="0"/>
+          <a:ext cx="0" cy="0"/>
+          <a:chOff x="0" y="0"/>
+          <a:chExt cx="0" cy="0"/>
+        </a:xfrm>
+      </p:grpSpPr>
+      <p:sp>
+        <p:nvSpPr>
+          <p:cNvPr id="2" name="Title 1">
+            <a:extLst>
+              <a:ext uri="{FF2B5EF4-FFF2-40B4-BE49-F238E27FC236}">
+                <a16:creationId xmlns:a16="http://schemas.microsoft.com/office/drawing/2014/main" id="{4CFA070C-C689-772D-B7BE-0BA632D79443}"/>
+              </a:ext>
+            </a:extLst>
+          </p:cNvPr>
+          <p:cNvSpPr>
+            <a:spLocks noGrp="1"/>
+          </p:cNvSpPr>
+          <p:nvPr>
+            <p:ph type="title"/>
+          </p:nvPr>
+        </p:nvSpPr>
+        <p:spPr/>
+        <p:txBody>
+          <a:bodyPr/>
+          <a:lstStyle/>
+          <a:p>
+            <a:r>
+              <a:rPr lang="en-US" dirty="0"/>
+              <a:t>Combining Objects</a:t>
+            </a:r>
+            <a:endParaRPr lang="en-CA" dirty="0"/>
+          </a:p>
+        </p:txBody>
+      </p:sp>
+      <p:sp>
+        <p:nvSpPr>
+          <p:cNvPr id="3" name="Content Placeholder 2">
+            <a:extLst>
+              <a:ext uri="{FF2B5EF4-FFF2-40B4-BE49-F238E27FC236}">
+                <a16:creationId xmlns:a16="http://schemas.microsoft.com/office/drawing/2014/main" id="{47117976-91DC-9EAF-0507-85941E090984}"/>
+              </a:ext>
+            </a:extLst>
+          </p:cNvPr>
+          <p:cNvSpPr>
+            <a:spLocks noGrp="1"/>
+          </p:cNvSpPr>
+          <p:nvPr>
+            <p:ph idx="1"/>
+          </p:nvPr>
+        </p:nvSpPr>
+        <p:spPr>
+          <a:xfrm>
+            <a:off x="1154954" y="2514048"/>
+            <a:ext cx="10006689" cy="4145170"/>
+          </a:xfrm>
+        </p:spPr>
+        <p:txBody>
+          <a:bodyPr>
+            <a:normAutofit/>
+          </a:bodyPr>
+          <a:lstStyle/>
+          <a:p>
+            <a:r>
+              <a:rPr lang="en-US" sz="2400" dirty="0"/>
+              <a:t>Exercise 3: Let’s write a code that outputs our name and age using the following syntax</a:t>
+            </a:r>
+          </a:p>
+          <a:p>
+            <a:pPr lvl="1"/>
+            <a:r>
+              <a:rPr lang="en-US" sz="2000" dirty="0"/>
+              <a:t>name = “Jade”</a:t>
+            </a:r>
+          </a:p>
+          <a:p>
+            <a:pPr lvl="1"/>
+            <a:r>
+              <a:rPr lang="en-US" sz="2000" dirty="0"/>
+              <a:t>age = 21</a:t>
+            </a:r>
+          </a:p>
+          <a:p>
+            <a:pPr lvl="1"/>
+            <a:r>
+              <a:rPr lang="en-US" sz="2000" dirty="0"/>
+              <a:t>print(“My name is”, name, “and I am”, age, “years old.”)</a:t>
+            </a:r>
+          </a:p>
+          <a:p>
+            <a:r>
+              <a:rPr lang="en-US" sz="2400" dirty="0"/>
+              <a:t>Notice the quotations around “Jade” (string object), and the lack of quotations around 21 (int object)</a:t>
+            </a:r>
+          </a:p>
+          <a:p>
+            <a:r>
+              <a:rPr lang="en-US" sz="2400" dirty="0"/>
+              <a:t>To combine different objects in a print statement, use a comma!</a:t>
+            </a:r>
+            <a:endParaRPr lang="en-CA" sz="2400" dirty="0"/>
+          </a:p>
+        </p:txBody>
+      </p:sp>
+    </p:spTree>
+    <p:extLst>
+      <p:ext uri="{BB962C8B-B14F-4D97-AF65-F5344CB8AC3E}">
+        <p14:creationId xmlns:p14="http://schemas.microsoft.com/office/powerpoint/2010/main" val="1698028890"/>
       </p:ext>
     </p:extLst>
   </p:cSld>

</xml_diff>

<commit_message>
Modified the Week 1 PPT and created the Week 2 PPT skeleton. Also added Week 1 solutions
</commit_message>
<xml_diff>
--- a/PPTs/Week1.pptx
+++ b/PPTs/Week1.pptx
@@ -11,22 +11,23 @@
     <p:sldId id="260" r:id="rId5"/>
     <p:sldId id="259" r:id="rId6"/>
     <p:sldId id="261" r:id="rId7"/>
-    <p:sldId id="262" r:id="rId8"/>
-    <p:sldId id="263" r:id="rId9"/>
-    <p:sldId id="265" r:id="rId10"/>
-    <p:sldId id="266" r:id="rId11"/>
-    <p:sldId id="267" r:id="rId12"/>
-    <p:sldId id="264" r:id="rId13"/>
-    <p:sldId id="268" r:id="rId14"/>
-    <p:sldId id="269" r:id="rId15"/>
-    <p:sldId id="270" r:id="rId16"/>
-    <p:sldId id="271" r:id="rId17"/>
-    <p:sldId id="272" r:id="rId18"/>
-    <p:sldId id="273" r:id="rId19"/>
-    <p:sldId id="274" r:id="rId20"/>
-    <p:sldId id="275" r:id="rId21"/>
-    <p:sldId id="276" r:id="rId22"/>
-    <p:sldId id="277" r:id="rId23"/>
+    <p:sldId id="278" r:id="rId8"/>
+    <p:sldId id="262" r:id="rId9"/>
+    <p:sldId id="263" r:id="rId10"/>
+    <p:sldId id="265" r:id="rId11"/>
+    <p:sldId id="266" r:id="rId12"/>
+    <p:sldId id="267" r:id="rId13"/>
+    <p:sldId id="264" r:id="rId14"/>
+    <p:sldId id="268" r:id="rId15"/>
+    <p:sldId id="269" r:id="rId16"/>
+    <p:sldId id="270" r:id="rId17"/>
+    <p:sldId id="271" r:id="rId18"/>
+    <p:sldId id="272" r:id="rId19"/>
+    <p:sldId id="273" r:id="rId20"/>
+    <p:sldId id="274" r:id="rId21"/>
+    <p:sldId id="275" r:id="rId22"/>
+    <p:sldId id="276" r:id="rId23"/>
+    <p:sldId id="277" r:id="rId24"/>
   </p:sldIdLst>
   <p:sldSz cx="12192000" cy="6858000"/>
   <p:notesSz cx="6858000" cy="9144000"/>
@@ -13772,6 +13773,131 @@
           <p:cNvPr id="2" name="Title 1">
             <a:extLst>
               <a:ext uri="{FF2B5EF4-FFF2-40B4-BE49-F238E27FC236}">
+                <a16:creationId xmlns:a16="http://schemas.microsoft.com/office/drawing/2014/main" id="{1BFD8C39-30AA-FE57-66A0-6733961D3925}"/>
+              </a:ext>
+            </a:extLst>
+          </p:cNvPr>
+          <p:cNvSpPr>
+            <a:spLocks noGrp="1"/>
+          </p:cNvSpPr>
+          <p:nvPr>
+            <p:ph type="title"/>
+          </p:nvPr>
+        </p:nvSpPr>
+        <p:spPr/>
+        <p:txBody>
+          <a:bodyPr/>
+          <a:lstStyle/>
+          <a:p>
+            <a:r>
+              <a:rPr lang="en-US" dirty="0"/>
+              <a:t>Git</a:t>
+            </a:r>
+            <a:endParaRPr lang="en-CA" dirty="0"/>
+          </a:p>
+        </p:txBody>
+      </p:sp>
+      <p:sp>
+        <p:nvSpPr>
+          <p:cNvPr id="3" name="Content Placeholder 2">
+            <a:extLst>
+              <a:ext uri="{FF2B5EF4-FFF2-40B4-BE49-F238E27FC236}">
+                <a16:creationId xmlns:a16="http://schemas.microsoft.com/office/drawing/2014/main" id="{FDEFAB9A-168A-BF24-FC4A-D59FA3AC6271}"/>
+              </a:ext>
+            </a:extLst>
+          </p:cNvPr>
+          <p:cNvSpPr>
+            <a:spLocks noGrp="1"/>
+          </p:cNvSpPr>
+          <p:nvPr>
+            <p:ph idx="1"/>
+          </p:nvPr>
+        </p:nvSpPr>
+        <p:spPr>
+          <a:xfrm>
+            <a:off x="1154954" y="2851978"/>
+            <a:ext cx="10255168" cy="3171136"/>
+          </a:xfrm>
+        </p:spPr>
+        <p:txBody>
+          <a:bodyPr>
+            <a:normAutofit/>
+          </a:bodyPr>
+          <a:lstStyle/>
+          <a:p>
+            <a:r>
+              <a:rPr lang="en-US" sz="2400" dirty="0"/>
+              <a:t>Git is a popular tool that allows easy and organized </a:t>
+            </a:r>
+            <a:r>
+              <a:rPr lang="en-US" sz="2400" b="1" dirty="0"/>
+              <a:t>version control</a:t>
+            </a:r>
+          </a:p>
+          <a:p>
+            <a:r>
+              <a:rPr lang="en-US" sz="2400" dirty="0"/>
+              <a:t>Allows you to keep track of changes made to your code and collaborate with other programmers</a:t>
+            </a:r>
+          </a:p>
+          <a:p>
+            <a:r>
+              <a:rPr lang="en-US" sz="2400" dirty="0"/>
+              <a:t>Allows you to easily revert changes and avoid costly mistakes</a:t>
+            </a:r>
+          </a:p>
+          <a:p>
+            <a:r>
+              <a:rPr lang="en-US" sz="2400" dirty="0"/>
+              <a:t>Overall an </a:t>
+            </a:r>
+            <a:r>
+              <a:rPr lang="en-US" sz="2400" b="1" dirty="0"/>
+              <a:t>absolutely indispensable</a:t>
+            </a:r>
+            <a:r>
+              <a:rPr lang="en-US" sz="2400" dirty="0"/>
+              <a:t> programming tool</a:t>
+            </a:r>
+            <a:endParaRPr lang="en-CA" sz="2400" dirty="0"/>
+          </a:p>
+        </p:txBody>
+      </p:sp>
+    </p:spTree>
+    <p:extLst>
+      <p:ext uri="{BB962C8B-B14F-4D97-AF65-F5344CB8AC3E}">
+        <p14:creationId xmlns:p14="http://schemas.microsoft.com/office/powerpoint/2010/main" val="3063112989"/>
+      </p:ext>
+    </p:extLst>
+  </p:cSld>
+  <p:clrMapOvr>
+    <a:masterClrMapping/>
+  </p:clrMapOvr>
+</p:sld>
+</file>
+
+<file path=ppt/slides/slide11.xml><?xml version="1.0" encoding="utf-8"?>
+<p:sld xmlns:a="http://schemas.openxmlformats.org/drawingml/2006/main" xmlns:r="http://schemas.openxmlformats.org/officeDocument/2006/relationships" xmlns:p="http://schemas.openxmlformats.org/presentationml/2006/main">
+  <p:cSld>
+    <p:spTree>
+      <p:nvGrpSpPr>
+        <p:cNvPr id="1" name=""/>
+        <p:cNvGrpSpPr/>
+        <p:nvPr/>
+      </p:nvGrpSpPr>
+      <p:grpSpPr>
+        <a:xfrm>
+          <a:off x="0" y="0"/>
+          <a:ext cx="0" cy="0"/>
+          <a:chOff x="0" y="0"/>
+          <a:chExt cx="0" cy="0"/>
+        </a:xfrm>
+      </p:grpSpPr>
+      <p:sp>
+        <p:nvSpPr>
+          <p:cNvPr id="2" name="Title 1">
+            <a:extLst>
+              <a:ext uri="{FF2B5EF4-FFF2-40B4-BE49-F238E27FC236}">
                 <a16:creationId xmlns:a16="http://schemas.microsoft.com/office/drawing/2014/main" id="{8A63BA58-79D3-B57D-4A62-A1895289AEA6}"/>
               </a:ext>
             </a:extLst>
@@ -13857,7 +13983,7 @@
             <a:pPr lvl="2"/>
             <a:r>
               <a:rPr lang="en-US" sz="1800" dirty="0"/>
-              <a:t>You should see a link that says “Click here to download the latest 64-bit version of Git for Windows</a:t>
+              <a:t>You should see a link that says “Click here to download the latest 64-bit version of Git for Windows”</a:t>
             </a:r>
           </a:p>
           <a:p>
@@ -13890,7 +14016,7 @@
 </p:sld>
 </file>
 
-<file path=ppt/slides/slide11.xml><?xml version="1.0" encoding="utf-8"?>
+<file path=ppt/slides/slide12.xml><?xml version="1.0" encoding="utf-8"?>
 <p:sld xmlns:a="http://schemas.openxmlformats.org/drawingml/2006/main" xmlns:r="http://schemas.openxmlformats.org/officeDocument/2006/relationships" xmlns:p="http://schemas.openxmlformats.org/presentationml/2006/main">
   <p:cSld>
     <p:spTree>
@@ -14038,7 +14164,14 @@
               <a:buChar char="Ø"/>
             </a:pPr>
             <a:r>
-              <a:rPr lang="en-US" sz="2000" dirty="0"/>
+              <a:rPr lang="en-US" sz="2000" dirty="0">
+                <a:solidFill>
+                  <a:schemeClr val="tx1">
+                    <a:lumMod val="75000"/>
+                    <a:lumOff val="25000"/>
+                  </a:schemeClr>
+                </a:solidFill>
+              </a:rPr>
               <a:t>Otherwise, just keep clicking on “next”</a:t>
             </a:r>
           </a:p>
@@ -14051,7 +14184,14 @@
               <a:buChar char="Ø"/>
             </a:pPr>
             <a:r>
-              <a:rPr lang="en-US" sz="2000" dirty="0"/>
+              <a:rPr lang="en-US" sz="2000" dirty="0">
+                <a:solidFill>
+                  <a:schemeClr val="tx1">
+                    <a:lumMod val="75000"/>
+                    <a:lumOff val="25000"/>
+                  </a:schemeClr>
+                </a:solidFill>
+              </a:rPr>
               <a:t>When you reach the end, click on “install”</a:t>
             </a:r>
           </a:p>
@@ -14064,7 +14204,14 @@
               <a:buChar char="Ø"/>
             </a:pPr>
             <a:r>
-              <a:rPr lang="en-US" sz="2000" dirty="0"/>
+              <a:rPr lang="en-US" sz="2000" dirty="0">
+                <a:solidFill>
+                  <a:schemeClr val="tx1">
+                    <a:lumMod val="75000"/>
+                    <a:lumOff val="25000"/>
+                  </a:schemeClr>
+                </a:solidFill>
+              </a:rPr>
               <a:t>This will install with the default configuration</a:t>
             </a:r>
           </a:p>
@@ -14083,7 +14230,7 @@
 </p:sld>
 </file>
 
-<file path=ppt/slides/slide12.xml><?xml version="1.0" encoding="utf-8"?>
+<file path=ppt/slides/slide13.xml><?xml version="1.0" encoding="utf-8"?>
 <p:sld xmlns:a="http://schemas.openxmlformats.org/drawingml/2006/main" xmlns:r="http://schemas.openxmlformats.org/officeDocument/2006/relationships" xmlns:p="http://schemas.openxmlformats.org/presentationml/2006/main">
   <p:cSld>
     <p:spTree>
@@ -14233,7 +14380,7 @@
 </p:sld>
 </file>
 
-<file path=ppt/slides/slide13.xml><?xml version="1.0" encoding="utf-8"?>
+<file path=ppt/slides/slide14.xml><?xml version="1.0" encoding="utf-8"?>
 <p:sld xmlns:a="http://schemas.openxmlformats.org/drawingml/2006/main" xmlns:r="http://schemas.openxmlformats.org/officeDocument/2006/relationships" xmlns:p="http://schemas.openxmlformats.org/presentationml/2006/main">
   <p:cSld>
     <p:spTree>
@@ -14679,7 +14826,7 @@
 </p:sld>
 </file>
 
-<file path=ppt/slides/slide14.xml><?xml version="1.0" encoding="utf-8"?>
+<file path=ppt/slides/slide15.xml><?xml version="1.0" encoding="utf-8"?>
 <p:sld xmlns:a="http://schemas.openxmlformats.org/drawingml/2006/main" xmlns:r="http://schemas.openxmlformats.org/officeDocument/2006/relationships" xmlns:p="http://schemas.openxmlformats.org/presentationml/2006/main">
   <p:cSld>
     <p:spTree>
@@ -15157,7 +15304,7 @@
 </p:sld>
 </file>
 
-<file path=ppt/slides/slide15.xml><?xml version="1.0" encoding="utf-8"?>
+<file path=ppt/slides/slide16.xml><?xml version="1.0" encoding="utf-8"?>
 <p:sld xmlns:a="http://schemas.openxmlformats.org/drawingml/2006/main" xmlns:r="http://schemas.openxmlformats.org/officeDocument/2006/relationships" xmlns:p="http://schemas.openxmlformats.org/presentationml/2006/main">
   <p:cSld>
     <p:spTree>
@@ -15292,8 +15439,8 @@
         </p:nvSpPr>
         <p:spPr>
           <a:xfrm>
-            <a:off x="1276528" y="4803359"/>
-            <a:ext cx="4100542" cy="1362213"/>
+            <a:off x="1276527" y="4803359"/>
+            <a:ext cx="6149509" cy="1362213"/>
           </a:xfrm>
           <a:prstGeom prst="rect">
             <a:avLst/>
@@ -15634,7 +15781,7 @@
 </p:sld>
 </file>
 
-<file path=ppt/slides/slide16.xml><?xml version="1.0" encoding="utf-8"?>
+<file path=ppt/slides/slide17.xml><?xml version="1.0" encoding="utf-8"?>
 <p:sld xmlns:a="http://schemas.openxmlformats.org/drawingml/2006/main" xmlns:r="http://schemas.openxmlformats.org/officeDocument/2006/relationships" xmlns:p="http://schemas.openxmlformats.org/presentationml/2006/main">
   <p:cSld>
     <p:spTree>
@@ -15706,8 +15853,8 @@
         </p:nvSpPr>
         <p:spPr>
           <a:xfrm>
-            <a:off x="1154954" y="2444473"/>
-            <a:ext cx="10076263" cy="2892840"/>
+            <a:off x="1154954" y="2299855"/>
+            <a:ext cx="10076263" cy="3722254"/>
           </a:xfrm>
         </p:spPr>
         <p:txBody>
@@ -15736,11 +15883,16 @@
             </a:r>
           </a:p>
           <a:p>
-            <a:pPr lvl="2"/>
-            <a:r>
-              <a:rPr lang="en-US" sz="1800" dirty="0"/>
-              <a:t>It should still be in your copied, so you should be able to simply right click and paste it!</a:t>
-            </a:r>
+            <a:pPr lvl="1"/>
+            <a:endParaRPr lang="en-US" sz="2000" dirty="0"/>
+          </a:p>
+          <a:p>
+            <a:pPr lvl="1"/>
+            <a:endParaRPr lang="en-US" sz="2000" dirty="0"/>
+          </a:p>
+          <a:p>
+            <a:pPr lvl="1"/>
+            <a:endParaRPr lang="en-US" sz="2000" dirty="0"/>
           </a:p>
           <a:p>
             <a:r>
@@ -15773,8 +15925,38 @@
         </p:blipFill>
         <p:spPr>
           <a:xfrm>
-            <a:off x="2078034" y="5636203"/>
+            <a:off x="1515097" y="6017370"/>
             <a:ext cx="8035932" cy="683612"/>
+          </a:xfrm>
+          <a:prstGeom prst="rect">
+            <a:avLst/>
+          </a:prstGeom>
+        </p:spPr>
+      </p:pic>
+      <p:pic>
+        <p:nvPicPr>
+          <p:cNvPr id="7" name="Picture 6">
+            <a:extLst>
+              <a:ext uri="{FF2B5EF4-FFF2-40B4-BE49-F238E27FC236}">
+                <a16:creationId xmlns:a16="http://schemas.microsoft.com/office/drawing/2014/main" id="{4B4D90D7-4181-BB44-1709-017AF50E950F}"/>
+              </a:ext>
+            </a:extLst>
+          </p:cNvPr>
+          <p:cNvPicPr>
+            <a:picLocks noChangeAspect="1"/>
+          </p:cNvPicPr>
+          <p:nvPr/>
+        </p:nvPicPr>
+        <p:blipFill>
+          <a:blip r:embed="rId3"/>
+          <a:stretch>
+            <a:fillRect/>
+          </a:stretch>
+        </p:blipFill>
+        <p:spPr>
+          <a:xfrm>
+            <a:off x="1737835" y="4011583"/>
+            <a:ext cx="7590457" cy="652779"/>
           </a:xfrm>
           <a:prstGeom prst="rect">
             <a:avLst/>
@@ -15794,7 +15976,7 @@
 </p:sld>
 </file>
 
-<file path=ppt/slides/slide17.xml><?xml version="1.0" encoding="utf-8"?>
+<file path=ppt/slides/slide18.xml><?xml version="1.0" encoding="utf-8"?>
 <p:sld xmlns:a="http://schemas.openxmlformats.org/drawingml/2006/main" xmlns:r="http://schemas.openxmlformats.org/officeDocument/2006/relationships" xmlns:p="http://schemas.openxmlformats.org/presentationml/2006/main">
   <p:cSld>
     <p:spTree>
@@ -15916,7 +16098,7 @@
 </p:sld>
 </file>
 
-<file path=ppt/slides/slide18.xml><?xml version="1.0" encoding="utf-8"?>
+<file path=ppt/slides/slide19.xml><?xml version="1.0" encoding="utf-8"?>
 <p:sld xmlns:a="http://schemas.openxmlformats.org/drawingml/2006/main" xmlns:r="http://schemas.openxmlformats.org/officeDocument/2006/relationships" xmlns:p="http://schemas.openxmlformats.org/presentationml/2006/main">
   <p:cSld>
     <p:spTree>
@@ -15980,8 +16162,8 @@
         </p:nvSpPr>
         <p:spPr>
           <a:xfrm>
-            <a:off x="1154954" y="2603500"/>
-            <a:ext cx="10235289" cy="3416300"/>
+            <a:off x="836095" y="2409536"/>
+            <a:ext cx="10519810" cy="4448464"/>
           </a:xfrm>
         </p:spPr>
         <p:txBody>
@@ -16018,6 +16200,33 @@
           </a:p>
           <a:p>
             <a:r>
+              <a:rPr lang="en-CA" sz="2600" dirty="0"/>
+              <a:t>If this command raises an error, type this in instead:</a:t>
+            </a:r>
+          </a:p>
+          <a:p>
+            <a:pPr lvl="1"/>
+            <a:r>
+              <a:rPr lang="en-CA" sz="2400" dirty="0"/>
+              <a:t>python –m notebook</a:t>
+            </a:r>
+          </a:p>
+          <a:p>
+            <a:r>
+              <a:rPr lang="en-CA" sz="2600" dirty="0"/>
+              <a:t>This should open up </a:t>
+            </a:r>
+            <a:r>
+              <a:rPr lang="en-CA" sz="2600" dirty="0" err="1"/>
+              <a:t>Jupyter</a:t>
+            </a:r>
+            <a:r>
+              <a:rPr lang="en-CA" sz="2600" dirty="0"/>
+              <a:t> Notebook in your web browser!</a:t>
+            </a:r>
+          </a:p>
+          <a:p>
+            <a:r>
               <a:rPr lang="en-CA" sz="2800" dirty="0"/>
               <a:t>Navigate to your cloned Intro-to-Python repo</a:t>
             </a:r>
@@ -16035,127 +16244,6 @@
     <p:extLst>
       <p:ext uri="{BB962C8B-B14F-4D97-AF65-F5344CB8AC3E}">
         <p14:creationId xmlns:p14="http://schemas.microsoft.com/office/powerpoint/2010/main" val="577431846"/>
-      </p:ext>
-    </p:extLst>
-  </p:cSld>
-  <p:clrMapOvr>
-    <a:masterClrMapping/>
-  </p:clrMapOvr>
-</p:sld>
-</file>
-
-<file path=ppt/slides/slide19.xml><?xml version="1.0" encoding="utf-8"?>
-<p:sld xmlns:a="http://schemas.openxmlformats.org/drawingml/2006/main" xmlns:r="http://schemas.openxmlformats.org/officeDocument/2006/relationships" xmlns:p="http://schemas.openxmlformats.org/presentationml/2006/main">
-  <p:cSld>
-    <p:spTree>
-      <p:nvGrpSpPr>
-        <p:cNvPr id="1" name=""/>
-        <p:cNvGrpSpPr/>
-        <p:nvPr/>
-      </p:nvGrpSpPr>
-      <p:grpSpPr>
-        <a:xfrm>
-          <a:off x="0" y="0"/>
-          <a:ext cx="0" cy="0"/>
-          <a:chOff x="0" y="0"/>
-          <a:chExt cx="0" cy="0"/>
-        </a:xfrm>
-      </p:grpSpPr>
-      <p:sp>
-        <p:nvSpPr>
-          <p:cNvPr id="2" name="Title 1">
-            <a:extLst>
-              <a:ext uri="{FF2B5EF4-FFF2-40B4-BE49-F238E27FC236}">
-                <a16:creationId xmlns:a16="http://schemas.microsoft.com/office/drawing/2014/main" id="{9308070F-BD25-A8E3-F6CB-08DDED378E80}"/>
-              </a:ext>
-            </a:extLst>
-          </p:cNvPr>
-          <p:cNvSpPr>
-            <a:spLocks noGrp="1"/>
-          </p:cNvSpPr>
-          <p:nvPr>
-            <p:ph type="title"/>
-          </p:nvPr>
-        </p:nvSpPr>
-        <p:spPr/>
-        <p:txBody>
-          <a:bodyPr/>
-          <a:lstStyle/>
-          <a:p>
-            <a:r>
-              <a:rPr lang="en-US" dirty="0"/>
-              <a:t>Hello World</a:t>
-            </a:r>
-            <a:endParaRPr lang="en-CA" dirty="0"/>
-          </a:p>
-        </p:txBody>
-      </p:sp>
-      <p:sp>
-        <p:nvSpPr>
-          <p:cNvPr id="3" name="Content Placeholder 2">
-            <a:extLst>
-              <a:ext uri="{FF2B5EF4-FFF2-40B4-BE49-F238E27FC236}">
-                <a16:creationId xmlns:a16="http://schemas.microsoft.com/office/drawing/2014/main" id="{B172465F-8357-18C2-3569-29D9428D234F}"/>
-              </a:ext>
-            </a:extLst>
-          </p:cNvPr>
-          <p:cNvSpPr>
-            <a:spLocks noGrp="1"/>
-          </p:cNvSpPr>
-          <p:nvPr>
-            <p:ph idx="1"/>
-          </p:nvPr>
-        </p:nvSpPr>
-        <p:spPr>
-          <a:xfrm>
-            <a:off x="1154954" y="2603500"/>
-            <a:ext cx="9579307" cy="3416300"/>
-          </a:xfrm>
-        </p:spPr>
-        <p:txBody>
-          <a:bodyPr>
-            <a:normAutofit/>
-          </a:bodyPr>
-          <a:lstStyle/>
-          <a:p>
-            <a:r>
-              <a:rPr lang="en-US" sz="2400" dirty="0"/>
-              <a:t>The first Python functionality we will learn is the “print” statement</a:t>
-            </a:r>
-          </a:p>
-          <a:p>
-            <a:r>
-              <a:rPr lang="en-US" sz="2400" dirty="0"/>
-              <a:t>As the name suggests, it allows the user to “print” a piece of information on the screen</a:t>
-            </a:r>
-          </a:p>
-          <a:p>
-            <a:r>
-              <a:rPr lang="en-US" sz="2400" dirty="0"/>
-              <a:t>Exercise 1: print out Hello World using the following syntax:</a:t>
-            </a:r>
-          </a:p>
-          <a:p>
-            <a:pPr lvl="1"/>
-            <a:r>
-              <a:rPr lang="en-US" sz="2000" dirty="0"/>
-              <a:t>print(“Hello World”)</a:t>
-            </a:r>
-          </a:p>
-          <a:p>
-            <a:pPr lvl="1"/>
-            <a:r>
-              <a:rPr lang="en-US" sz="2000" dirty="0"/>
-              <a:t>Quotes are important!</a:t>
-            </a:r>
-            <a:endParaRPr lang="en-CA" sz="2000" dirty="0"/>
-          </a:p>
-        </p:txBody>
-      </p:sp>
-    </p:spTree>
-    <p:extLst>
-      <p:ext uri="{BB962C8B-B14F-4D97-AF65-F5344CB8AC3E}">
-        <p14:creationId xmlns:p14="http://schemas.microsoft.com/office/powerpoint/2010/main" val="4261117256"/>
       </p:ext>
     </p:extLst>
   </p:cSld>
@@ -16323,6 +16411,126 @@
           <p:cNvPr id="2" name="Title 1">
             <a:extLst>
               <a:ext uri="{FF2B5EF4-FFF2-40B4-BE49-F238E27FC236}">
+                <a16:creationId xmlns:a16="http://schemas.microsoft.com/office/drawing/2014/main" id="{9308070F-BD25-A8E3-F6CB-08DDED378E80}"/>
+              </a:ext>
+            </a:extLst>
+          </p:cNvPr>
+          <p:cNvSpPr>
+            <a:spLocks noGrp="1"/>
+          </p:cNvSpPr>
+          <p:nvPr>
+            <p:ph type="title"/>
+          </p:nvPr>
+        </p:nvSpPr>
+        <p:spPr/>
+        <p:txBody>
+          <a:bodyPr/>
+          <a:lstStyle/>
+          <a:p>
+            <a:r>
+              <a:rPr lang="en-US" dirty="0"/>
+              <a:t>Hello World</a:t>
+            </a:r>
+            <a:endParaRPr lang="en-CA" dirty="0"/>
+          </a:p>
+        </p:txBody>
+      </p:sp>
+      <p:sp>
+        <p:nvSpPr>
+          <p:cNvPr id="3" name="Content Placeholder 2">
+            <a:extLst>
+              <a:ext uri="{FF2B5EF4-FFF2-40B4-BE49-F238E27FC236}">
+                <a16:creationId xmlns:a16="http://schemas.microsoft.com/office/drawing/2014/main" id="{B172465F-8357-18C2-3569-29D9428D234F}"/>
+              </a:ext>
+            </a:extLst>
+          </p:cNvPr>
+          <p:cNvSpPr>
+            <a:spLocks noGrp="1"/>
+          </p:cNvSpPr>
+          <p:nvPr>
+            <p:ph idx="1"/>
+          </p:nvPr>
+        </p:nvSpPr>
+        <p:spPr>
+          <a:xfrm>
+            <a:off x="1154954" y="2603500"/>
+            <a:ext cx="9579307" cy="3416300"/>
+          </a:xfrm>
+        </p:spPr>
+        <p:txBody>
+          <a:bodyPr>
+            <a:normAutofit/>
+          </a:bodyPr>
+          <a:lstStyle/>
+          <a:p>
+            <a:r>
+              <a:rPr lang="en-US" sz="2400" dirty="0"/>
+              <a:t>The first Python functionality we will learn is the “print” statement</a:t>
+            </a:r>
+          </a:p>
+          <a:p>
+            <a:r>
+              <a:rPr lang="en-US" sz="2400" dirty="0"/>
+              <a:t>As the name suggests, it allows the user to “print” a piece of information on the screen</a:t>
+            </a:r>
+          </a:p>
+          <a:p>
+            <a:r>
+              <a:rPr lang="en-US" sz="2400" dirty="0"/>
+              <a:t>Exercise 1: print out Hello World using the following syntax:</a:t>
+            </a:r>
+          </a:p>
+          <a:p>
+            <a:pPr lvl="1"/>
+            <a:r>
+              <a:rPr lang="en-US" sz="2000" dirty="0"/>
+              <a:t>print(“Hello World”)</a:t>
+            </a:r>
+          </a:p>
+          <a:p>
+            <a:r>
+              <a:rPr lang="en-US" sz="2200" dirty="0"/>
+              <a:t>Quotes are important!</a:t>
+            </a:r>
+            <a:endParaRPr lang="en-CA" sz="2200" dirty="0"/>
+          </a:p>
+        </p:txBody>
+      </p:sp>
+    </p:spTree>
+    <p:extLst>
+      <p:ext uri="{BB962C8B-B14F-4D97-AF65-F5344CB8AC3E}">
+        <p14:creationId xmlns:p14="http://schemas.microsoft.com/office/powerpoint/2010/main" val="4261117256"/>
+      </p:ext>
+    </p:extLst>
+  </p:cSld>
+  <p:clrMapOvr>
+    <a:masterClrMapping/>
+  </p:clrMapOvr>
+</p:sld>
+</file>
+
+<file path=ppt/slides/slide21.xml><?xml version="1.0" encoding="utf-8"?>
+<p:sld xmlns:a="http://schemas.openxmlformats.org/drawingml/2006/main" xmlns:r="http://schemas.openxmlformats.org/officeDocument/2006/relationships" xmlns:p="http://schemas.openxmlformats.org/presentationml/2006/main">
+  <p:cSld>
+    <p:spTree>
+      <p:nvGrpSpPr>
+        <p:cNvPr id="1" name=""/>
+        <p:cNvGrpSpPr/>
+        <p:nvPr/>
+      </p:nvGrpSpPr>
+      <p:grpSpPr>
+        <a:xfrm>
+          <a:off x="0" y="0"/>
+          <a:ext cx="0" cy="0"/>
+          <a:chOff x="0" y="0"/>
+          <a:chExt cx="0" cy="0"/>
+        </a:xfrm>
+      </p:grpSpPr>
+      <p:sp>
+        <p:nvSpPr>
+          <p:cNvPr id="2" name="Title 1">
+            <a:extLst>
+              <a:ext uri="{FF2B5EF4-FFF2-40B4-BE49-F238E27FC236}">
                 <a16:creationId xmlns:a16="http://schemas.microsoft.com/office/drawing/2014/main" id="{502F6D6B-4216-2788-7B3A-DB8A998504DE}"/>
               </a:ext>
             </a:extLst>
@@ -16449,7 +16657,7 @@
 </p:sld>
 </file>
 
-<file path=ppt/slides/slide21.xml><?xml version="1.0" encoding="utf-8"?>
+<file path=ppt/slides/slide22.xml><?xml version="1.0" encoding="utf-8"?>
 <p:sld xmlns:a="http://schemas.openxmlformats.org/drawingml/2006/main" xmlns:r="http://schemas.openxmlformats.org/officeDocument/2006/relationships" xmlns:p="http://schemas.openxmlformats.org/presentationml/2006/main">
   <p:cSld>
     <p:spTree>
@@ -16624,7 +16832,7 @@
 </p:sld>
 </file>
 
-<file path=ppt/slides/slide22.xml><?xml version="1.0" encoding="utf-8"?>
+<file path=ppt/slides/slide23.xml><?xml version="1.0" encoding="utf-8"?>
 <p:sld xmlns:a="http://schemas.openxmlformats.org/drawingml/2006/main" xmlns:r="http://schemas.openxmlformats.org/officeDocument/2006/relationships" xmlns:p="http://schemas.openxmlformats.org/presentationml/2006/main">
   <p:cSld>
     <p:spTree>
@@ -17293,6 +17501,13 @@
               <a:t>Click on Download Python 3.10.5</a:t>
             </a:r>
           </a:p>
+          <a:p>
+            <a:pPr lvl="1"/>
+            <a:r>
+              <a:rPr lang="en-CA" sz="2000" dirty="0"/>
+              <a:t>Open the .exe file that appears in your Downloads</a:t>
+            </a:r>
+          </a:p>
         </p:txBody>
       </p:sp>
     </p:spTree>
@@ -17330,6 +17545,424 @@
           <p:cNvPr id="2" name="Title 1">
             <a:extLst>
               <a:ext uri="{FF2B5EF4-FFF2-40B4-BE49-F238E27FC236}">
+                <a16:creationId xmlns:a16="http://schemas.microsoft.com/office/drawing/2014/main" id="{CDA589B4-BD2F-295B-D4B4-9AD686ED54C7}"/>
+              </a:ext>
+            </a:extLst>
+          </p:cNvPr>
+          <p:cNvSpPr>
+            <a:spLocks noGrp="1"/>
+          </p:cNvSpPr>
+          <p:nvPr>
+            <p:ph type="title"/>
+          </p:nvPr>
+        </p:nvSpPr>
+        <p:spPr/>
+        <p:txBody>
+          <a:bodyPr/>
+          <a:lstStyle/>
+          <a:p>
+            <a:r>
+              <a:rPr lang="en-US" dirty="0"/>
+              <a:t>Python add-ons</a:t>
+            </a:r>
+            <a:endParaRPr lang="en-CA" dirty="0"/>
+          </a:p>
+        </p:txBody>
+      </p:sp>
+      <p:sp>
+        <p:nvSpPr>
+          <p:cNvPr id="3" name="Content Placeholder 2">
+            <a:extLst>
+              <a:ext uri="{FF2B5EF4-FFF2-40B4-BE49-F238E27FC236}">
+                <a16:creationId xmlns:a16="http://schemas.microsoft.com/office/drawing/2014/main" id="{DC91758D-8635-BB60-2DDF-8FF1C8F80791}"/>
+              </a:ext>
+            </a:extLst>
+          </p:cNvPr>
+          <p:cNvSpPr>
+            <a:spLocks noGrp="1"/>
+          </p:cNvSpPr>
+          <p:nvPr>
+            <p:ph idx="1"/>
+          </p:nvPr>
+        </p:nvSpPr>
+        <p:spPr>
+          <a:xfrm>
+            <a:off x="511563" y="2437245"/>
+            <a:ext cx="4857919" cy="706964"/>
+          </a:xfrm>
+        </p:spPr>
+        <p:txBody>
+          <a:bodyPr>
+            <a:normAutofit fontScale="92500" lnSpcReduction="10000"/>
+          </a:bodyPr>
+          <a:lstStyle/>
+          <a:p>
+            <a:r>
+              <a:rPr lang="en-US" sz="2400" dirty="0"/>
+              <a:t>Make sure all these features are selected before clicking next</a:t>
+            </a:r>
+            <a:endParaRPr lang="en-CA" sz="2400" dirty="0"/>
+          </a:p>
+        </p:txBody>
+      </p:sp>
+      <p:pic>
+        <p:nvPicPr>
+          <p:cNvPr id="5" name="Picture 4">
+            <a:extLst>
+              <a:ext uri="{FF2B5EF4-FFF2-40B4-BE49-F238E27FC236}">
+                <a16:creationId xmlns:a16="http://schemas.microsoft.com/office/drawing/2014/main" id="{98E2A7FA-5DD4-2B8E-6F2E-0AD7CCAD00E0}"/>
+              </a:ext>
+            </a:extLst>
+          </p:cNvPr>
+          <p:cNvPicPr>
+            <a:picLocks noChangeAspect="1"/>
+          </p:cNvPicPr>
+          <p:nvPr/>
+        </p:nvPicPr>
+        <p:blipFill>
+          <a:blip r:embed="rId2"/>
+          <a:stretch>
+            <a:fillRect/>
+          </a:stretch>
+        </p:blipFill>
+        <p:spPr>
+          <a:xfrm>
+            <a:off x="511563" y="3310464"/>
+            <a:ext cx="5056220" cy="3102680"/>
+          </a:xfrm>
+          <a:prstGeom prst="rect">
+            <a:avLst/>
+          </a:prstGeom>
+        </p:spPr>
+      </p:pic>
+      <p:sp>
+        <p:nvSpPr>
+          <p:cNvPr id="6" name="Content Placeholder 2">
+            <a:extLst>
+              <a:ext uri="{FF2B5EF4-FFF2-40B4-BE49-F238E27FC236}">
+                <a16:creationId xmlns:a16="http://schemas.microsoft.com/office/drawing/2014/main" id="{D3E7E876-981E-1BB2-955B-AD339ACE4143}"/>
+              </a:ext>
+            </a:extLst>
+          </p:cNvPr>
+          <p:cNvSpPr txBox="1">
+            <a:spLocks/>
+          </p:cNvSpPr>
+          <p:nvPr/>
+        </p:nvSpPr>
+        <p:spPr>
+          <a:xfrm>
+            <a:off x="6624218" y="2437245"/>
+            <a:ext cx="5093953" cy="706964"/>
+          </a:xfrm>
+          <a:prstGeom prst="rect">
+            <a:avLst/>
+          </a:prstGeom>
+        </p:spPr>
+        <p:txBody>
+          <a:bodyPr vert="horz" lIns="91440" tIns="45720" rIns="91440" bIns="45720" rtlCol="0">
+            <a:normAutofit fontScale="92500" lnSpcReduction="10000"/>
+          </a:bodyPr>
+          <a:lstStyle>
+            <a:lvl1pPr marL="342900" indent="-342900" algn="l" defTabSz="457200" rtl="0" eaLnBrk="1" latinLnBrk="0" hangingPunct="1">
+              <a:spcBef>
+                <a:spcPts val="1000"/>
+              </a:spcBef>
+              <a:spcAft>
+                <a:spcPts val="0"/>
+              </a:spcAft>
+              <a:buClr>
+                <a:schemeClr val="accent1"/>
+              </a:buClr>
+              <a:buSzPct val="80000"/>
+              <a:buFont typeface="Wingdings 3" charset="2"/>
+              <a:buChar char=""/>
+              <a:defRPr sz="1800" b="0" i="0" kern="1200">
+                <a:solidFill>
+                  <a:schemeClr val="tx1">
+                    <a:lumMod val="75000"/>
+                    <a:lumOff val="25000"/>
+                  </a:schemeClr>
+                </a:solidFill>
+                <a:latin typeface="+mn-lt"/>
+                <a:ea typeface="+mn-ea"/>
+                <a:cs typeface="+mn-cs"/>
+              </a:defRPr>
+            </a:lvl1pPr>
+            <a:lvl2pPr marL="742950" indent="-285750" algn="l" defTabSz="457200" rtl="0" eaLnBrk="1" latinLnBrk="0" hangingPunct="1">
+              <a:spcBef>
+                <a:spcPts val="1000"/>
+              </a:spcBef>
+              <a:spcAft>
+                <a:spcPts val="0"/>
+              </a:spcAft>
+              <a:buClr>
+                <a:schemeClr val="accent1"/>
+              </a:buClr>
+              <a:buSzPct val="80000"/>
+              <a:buFont typeface="Wingdings 3" charset="2"/>
+              <a:buChar char=""/>
+              <a:defRPr sz="1600" b="0" i="0" kern="1200">
+                <a:solidFill>
+                  <a:schemeClr val="tx1">
+                    <a:lumMod val="75000"/>
+                    <a:lumOff val="25000"/>
+                  </a:schemeClr>
+                </a:solidFill>
+                <a:latin typeface="+mn-lt"/>
+                <a:ea typeface="+mn-ea"/>
+                <a:cs typeface="+mn-cs"/>
+              </a:defRPr>
+            </a:lvl2pPr>
+            <a:lvl3pPr marL="1143000" indent="-228600" algn="l" defTabSz="457200" rtl="0" eaLnBrk="1" latinLnBrk="0" hangingPunct="1">
+              <a:spcBef>
+                <a:spcPts val="1000"/>
+              </a:spcBef>
+              <a:spcAft>
+                <a:spcPts val="0"/>
+              </a:spcAft>
+              <a:buClr>
+                <a:schemeClr val="accent1"/>
+              </a:buClr>
+              <a:buSzPct val="80000"/>
+              <a:buFont typeface="Wingdings 3" charset="2"/>
+              <a:buChar char=""/>
+              <a:defRPr sz="1400" b="0" i="0" kern="1200">
+                <a:solidFill>
+                  <a:schemeClr val="tx1">
+                    <a:lumMod val="75000"/>
+                    <a:lumOff val="25000"/>
+                  </a:schemeClr>
+                </a:solidFill>
+                <a:latin typeface="+mn-lt"/>
+                <a:ea typeface="+mn-ea"/>
+                <a:cs typeface="+mn-cs"/>
+              </a:defRPr>
+            </a:lvl3pPr>
+            <a:lvl4pPr marL="1600200" indent="-228600" algn="l" defTabSz="457200" rtl="0" eaLnBrk="1" latinLnBrk="0" hangingPunct="1">
+              <a:spcBef>
+                <a:spcPts val="1000"/>
+              </a:spcBef>
+              <a:spcAft>
+                <a:spcPts val="0"/>
+              </a:spcAft>
+              <a:buClr>
+                <a:schemeClr val="accent1"/>
+              </a:buClr>
+              <a:buSzPct val="80000"/>
+              <a:buFont typeface="Wingdings 3" charset="2"/>
+              <a:buChar char=""/>
+              <a:defRPr sz="1200" b="0" i="0" kern="1200">
+                <a:solidFill>
+                  <a:schemeClr val="tx1">
+                    <a:lumMod val="75000"/>
+                    <a:lumOff val="25000"/>
+                  </a:schemeClr>
+                </a:solidFill>
+                <a:latin typeface="+mn-lt"/>
+                <a:ea typeface="+mn-ea"/>
+                <a:cs typeface="+mn-cs"/>
+              </a:defRPr>
+            </a:lvl4pPr>
+            <a:lvl5pPr marL="2057400" indent="-228600" algn="l" defTabSz="457200" rtl="0" eaLnBrk="1" latinLnBrk="0" hangingPunct="1">
+              <a:spcBef>
+                <a:spcPts val="1000"/>
+              </a:spcBef>
+              <a:spcAft>
+                <a:spcPts val="0"/>
+              </a:spcAft>
+              <a:buClr>
+                <a:schemeClr val="accent1"/>
+              </a:buClr>
+              <a:buSzPct val="80000"/>
+              <a:buFont typeface="Wingdings 3" charset="2"/>
+              <a:buChar char=""/>
+              <a:defRPr sz="1200" b="0" i="0" kern="1200">
+                <a:solidFill>
+                  <a:schemeClr val="tx1">
+                    <a:lumMod val="75000"/>
+                    <a:lumOff val="25000"/>
+                  </a:schemeClr>
+                </a:solidFill>
+                <a:latin typeface="+mn-lt"/>
+                <a:ea typeface="+mn-ea"/>
+                <a:cs typeface="+mn-cs"/>
+              </a:defRPr>
+            </a:lvl5pPr>
+            <a:lvl6pPr marL="2514600" indent="-228600" algn="l" defTabSz="457200" rtl="0" eaLnBrk="1" latinLnBrk="0" hangingPunct="1">
+              <a:spcBef>
+                <a:spcPts val="1000"/>
+              </a:spcBef>
+              <a:spcAft>
+                <a:spcPts val="0"/>
+              </a:spcAft>
+              <a:buClr>
+                <a:schemeClr val="accent1"/>
+              </a:buClr>
+              <a:buSzPct val="80000"/>
+              <a:buFont typeface="Wingdings 3" charset="2"/>
+              <a:buChar char=""/>
+              <a:defRPr sz="1200" b="0" i="0" kern="1200">
+                <a:solidFill>
+                  <a:schemeClr val="tx1">
+                    <a:lumMod val="75000"/>
+                    <a:lumOff val="25000"/>
+                  </a:schemeClr>
+                </a:solidFill>
+                <a:latin typeface="+mn-lt"/>
+                <a:ea typeface="+mn-ea"/>
+                <a:cs typeface="+mn-cs"/>
+              </a:defRPr>
+            </a:lvl6pPr>
+            <a:lvl7pPr marL="2971800" indent="-228600" algn="l" defTabSz="457200" rtl="0" eaLnBrk="1" latinLnBrk="0" hangingPunct="1">
+              <a:spcBef>
+                <a:spcPts val="1000"/>
+              </a:spcBef>
+              <a:spcAft>
+                <a:spcPts val="0"/>
+              </a:spcAft>
+              <a:buClr>
+                <a:schemeClr val="accent1"/>
+              </a:buClr>
+              <a:buSzPct val="80000"/>
+              <a:buFont typeface="Wingdings 3" charset="2"/>
+              <a:buChar char=""/>
+              <a:defRPr sz="1200" b="0" i="0" kern="1200">
+                <a:solidFill>
+                  <a:schemeClr val="tx1">
+                    <a:lumMod val="75000"/>
+                    <a:lumOff val="25000"/>
+                  </a:schemeClr>
+                </a:solidFill>
+                <a:latin typeface="+mn-lt"/>
+                <a:ea typeface="+mn-ea"/>
+                <a:cs typeface="+mn-cs"/>
+              </a:defRPr>
+            </a:lvl7pPr>
+            <a:lvl8pPr marL="3429000" indent="-228600" algn="l" defTabSz="457200" rtl="0" eaLnBrk="1" latinLnBrk="0" hangingPunct="1">
+              <a:spcBef>
+                <a:spcPts val="1000"/>
+              </a:spcBef>
+              <a:spcAft>
+                <a:spcPts val="0"/>
+              </a:spcAft>
+              <a:buClr>
+                <a:schemeClr val="accent1"/>
+              </a:buClr>
+              <a:buSzPct val="80000"/>
+              <a:buFont typeface="Wingdings 3" charset="2"/>
+              <a:buChar char=""/>
+              <a:defRPr sz="1200" b="0" i="0" kern="1200">
+                <a:solidFill>
+                  <a:schemeClr val="tx1">
+                    <a:lumMod val="75000"/>
+                    <a:lumOff val="25000"/>
+                  </a:schemeClr>
+                </a:solidFill>
+                <a:latin typeface="+mn-lt"/>
+                <a:ea typeface="+mn-ea"/>
+                <a:cs typeface="+mn-cs"/>
+              </a:defRPr>
+            </a:lvl8pPr>
+            <a:lvl9pPr marL="3886200" indent="-228600" algn="l" defTabSz="457200" rtl="0" eaLnBrk="1" latinLnBrk="0" hangingPunct="1">
+              <a:spcBef>
+                <a:spcPts val="1000"/>
+              </a:spcBef>
+              <a:spcAft>
+                <a:spcPts val="0"/>
+              </a:spcAft>
+              <a:buClr>
+                <a:schemeClr val="accent1"/>
+              </a:buClr>
+              <a:buSzPct val="80000"/>
+              <a:buFont typeface="Wingdings 3" charset="2"/>
+              <a:buChar char=""/>
+              <a:defRPr sz="1200" b="0" i="0" kern="1200">
+                <a:solidFill>
+                  <a:schemeClr val="tx1">
+                    <a:lumMod val="75000"/>
+                    <a:lumOff val="25000"/>
+                  </a:schemeClr>
+                </a:solidFill>
+                <a:latin typeface="+mn-lt"/>
+                <a:ea typeface="+mn-ea"/>
+                <a:cs typeface="+mn-cs"/>
+              </a:defRPr>
+            </a:lvl9pPr>
+          </a:lstStyle>
+          <a:p>
+            <a:r>
+              <a:rPr lang="en-US" sz="2400" dirty="0"/>
+              <a:t>Make sure all these features are selected before clicking install</a:t>
+            </a:r>
+            <a:endParaRPr lang="en-CA" sz="2400" dirty="0"/>
+          </a:p>
+        </p:txBody>
+      </p:sp>
+      <p:pic>
+        <p:nvPicPr>
+          <p:cNvPr id="9" name="Picture 8">
+            <a:extLst>
+              <a:ext uri="{FF2B5EF4-FFF2-40B4-BE49-F238E27FC236}">
+                <a16:creationId xmlns:a16="http://schemas.microsoft.com/office/drawing/2014/main" id="{A3D35E01-7E9F-E1F9-0359-D026B65B2955}"/>
+              </a:ext>
+            </a:extLst>
+          </p:cNvPr>
+          <p:cNvPicPr>
+            <a:picLocks noChangeAspect="1"/>
+          </p:cNvPicPr>
+          <p:nvPr/>
+        </p:nvPicPr>
+        <p:blipFill>
+          <a:blip r:embed="rId3"/>
+          <a:stretch>
+            <a:fillRect/>
+          </a:stretch>
+        </p:blipFill>
+        <p:spPr>
+          <a:xfrm>
+            <a:off x="6624219" y="3310464"/>
+            <a:ext cx="5093953" cy="3102680"/>
+          </a:xfrm>
+          <a:prstGeom prst="rect">
+            <a:avLst/>
+          </a:prstGeom>
+        </p:spPr>
+      </p:pic>
+    </p:spTree>
+    <p:extLst>
+      <p:ext uri="{BB962C8B-B14F-4D97-AF65-F5344CB8AC3E}">
+        <p14:creationId xmlns:p14="http://schemas.microsoft.com/office/powerpoint/2010/main" val="2568622040"/>
+      </p:ext>
+    </p:extLst>
+  </p:cSld>
+  <p:clrMapOvr>
+    <a:masterClrMapping/>
+  </p:clrMapOvr>
+</p:sld>
+</file>
+
+<file path=ppt/slides/slide8.xml><?xml version="1.0" encoding="utf-8"?>
+<p:sld xmlns:a="http://schemas.openxmlformats.org/drawingml/2006/main" xmlns:r="http://schemas.openxmlformats.org/officeDocument/2006/relationships" xmlns:p="http://schemas.openxmlformats.org/presentationml/2006/main">
+  <p:cSld>
+    <p:spTree>
+      <p:nvGrpSpPr>
+        <p:cNvPr id="1" name=""/>
+        <p:cNvGrpSpPr/>
+        <p:nvPr/>
+      </p:nvGrpSpPr>
+      <p:grpSpPr>
+        <a:xfrm>
+          <a:off x="0" y="0"/>
+          <a:ext cx="0" cy="0"/>
+          <a:chOff x="0" y="0"/>
+          <a:chExt cx="0" cy="0"/>
+        </a:xfrm>
+      </p:grpSpPr>
+      <p:sp>
+        <p:nvSpPr>
+          <p:cNvPr id="2" name="Title 1">
+            <a:extLst>
+              <a:ext uri="{FF2B5EF4-FFF2-40B4-BE49-F238E27FC236}">
                 <a16:creationId xmlns:a16="http://schemas.microsoft.com/office/drawing/2014/main" id="{0D438F45-0C23-9E14-5FA2-03D47D6C6679}"/>
               </a:ext>
             </a:extLst>
@@ -17448,7 +18081,7 @@
 </p:sld>
 </file>
 
-<file path=ppt/slides/slide8.xml><?xml version="1.0" encoding="utf-8"?>
+<file path=ppt/slides/slide9.xml><?xml version="1.0" encoding="utf-8"?>
 <p:sld xmlns:a="http://schemas.openxmlformats.org/drawingml/2006/main" xmlns:r="http://schemas.openxmlformats.org/officeDocument/2006/relationships" xmlns:p="http://schemas.openxmlformats.org/presentationml/2006/main">
   <p:cSld>
     <p:spTree>
@@ -17516,8 +18149,8 @@
         </p:nvSpPr>
         <p:spPr>
           <a:xfrm>
-            <a:off x="1154954" y="2305325"/>
-            <a:ext cx="10603037" cy="4552675"/>
+            <a:off x="1154954" y="2480816"/>
+            <a:ext cx="10603037" cy="4003112"/>
           </a:xfrm>
         </p:spPr>
         <p:txBody>
@@ -17589,34 +18222,19 @@
           <a:p>
             <a:pPr lvl="1"/>
             <a:r>
-              <a:rPr lang="en-US" sz="2000" dirty="0"/>
-              <a:t>3) Launch </a:t>
-            </a:r>
-            <a:r>
               <a:rPr lang="en-US" sz="2000" dirty="0" err="1"/>
               <a:t>Jupyter</a:t>
             </a:r>
             <a:r>
               <a:rPr lang="en-US" sz="2000" dirty="0"/>
-              <a:t> Notebook by copy-and-pasting the following command:</a:t>
-            </a:r>
-          </a:p>
-          <a:p>
-            <a:pPr lvl="2"/>
-            <a:r>
-              <a:rPr lang="en-US" sz="1800" dirty="0" err="1"/>
-              <a:t>jupyter</a:t>
-            </a:r>
-            <a:r>
-              <a:rPr lang="en-US" sz="1800" dirty="0"/>
-              <a:t> notebook</a:t>
-            </a:r>
-          </a:p>
-          <a:p>
-            <a:pPr marL="914400" lvl="2" indent="0">
+              <a:t> Notebook is now installed and ready to use!</a:t>
+            </a:r>
+          </a:p>
+          <a:p>
+            <a:pPr marL="514350" lvl="1" indent="0">
               <a:buNone/>
             </a:pPr>
-            <a:endParaRPr lang="en-US" sz="1800" dirty="0"/>
+            <a:endParaRPr lang="en-US" sz="2000" dirty="0"/>
           </a:p>
           <a:p>
             <a:pPr lvl="2"/>
@@ -17628,131 +18246,6 @@
     <p:extLst>
       <p:ext uri="{BB962C8B-B14F-4D97-AF65-F5344CB8AC3E}">
         <p14:creationId xmlns:p14="http://schemas.microsoft.com/office/powerpoint/2010/main" val="608987117"/>
-      </p:ext>
-    </p:extLst>
-  </p:cSld>
-  <p:clrMapOvr>
-    <a:masterClrMapping/>
-  </p:clrMapOvr>
-</p:sld>
-</file>
-
-<file path=ppt/slides/slide9.xml><?xml version="1.0" encoding="utf-8"?>
-<p:sld xmlns:a="http://schemas.openxmlformats.org/drawingml/2006/main" xmlns:r="http://schemas.openxmlformats.org/officeDocument/2006/relationships" xmlns:p="http://schemas.openxmlformats.org/presentationml/2006/main">
-  <p:cSld>
-    <p:spTree>
-      <p:nvGrpSpPr>
-        <p:cNvPr id="1" name=""/>
-        <p:cNvGrpSpPr/>
-        <p:nvPr/>
-      </p:nvGrpSpPr>
-      <p:grpSpPr>
-        <a:xfrm>
-          <a:off x="0" y="0"/>
-          <a:ext cx="0" cy="0"/>
-          <a:chOff x="0" y="0"/>
-          <a:chExt cx="0" cy="0"/>
-        </a:xfrm>
-      </p:grpSpPr>
-      <p:sp>
-        <p:nvSpPr>
-          <p:cNvPr id="2" name="Title 1">
-            <a:extLst>
-              <a:ext uri="{FF2B5EF4-FFF2-40B4-BE49-F238E27FC236}">
-                <a16:creationId xmlns:a16="http://schemas.microsoft.com/office/drawing/2014/main" id="{1BFD8C39-30AA-FE57-66A0-6733961D3925}"/>
-              </a:ext>
-            </a:extLst>
-          </p:cNvPr>
-          <p:cNvSpPr>
-            <a:spLocks noGrp="1"/>
-          </p:cNvSpPr>
-          <p:nvPr>
-            <p:ph type="title"/>
-          </p:nvPr>
-        </p:nvSpPr>
-        <p:spPr/>
-        <p:txBody>
-          <a:bodyPr/>
-          <a:lstStyle/>
-          <a:p>
-            <a:r>
-              <a:rPr lang="en-US" dirty="0"/>
-              <a:t>Git</a:t>
-            </a:r>
-            <a:endParaRPr lang="en-CA" dirty="0"/>
-          </a:p>
-        </p:txBody>
-      </p:sp>
-      <p:sp>
-        <p:nvSpPr>
-          <p:cNvPr id="3" name="Content Placeholder 2">
-            <a:extLst>
-              <a:ext uri="{FF2B5EF4-FFF2-40B4-BE49-F238E27FC236}">
-                <a16:creationId xmlns:a16="http://schemas.microsoft.com/office/drawing/2014/main" id="{FDEFAB9A-168A-BF24-FC4A-D59FA3AC6271}"/>
-              </a:ext>
-            </a:extLst>
-          </p:cNvPr>
-          <p:cNvSpPr>
-            <a:spLocks noGrp="1"/>
-          </p:cNvSpPr>
-          <p:nvPr>
-            <p:ph idx="1"/>
-          </p:nvPr>
-        </p:nvSpPr>
-        <p:spPr>
-          <a:xfrm>
-            <a:off x="1154954" y="2851978"/>
-            <a:ext cx="10255168" cy="3171136"/>
-          </a:xfrm>
-        </p:spPr>
-        <p:txBody>
-          <a:bodyPr>
-            <a:normAutofit/>
-          </a:bodyPr>
-          <a:lstStyle/>
-          <a:p>
-            <a:r>
-              <a:rPr lang="en-US" sz="2400" dirty="0"/>
-              <a:t>Git is a popular tool that allows easy and organized </a:t>
-            </a:r>
-            <a:r>
-              <a:rPr lang="en-US" sz="2400" b="1" dirty="0"/>
-              <a:t>version control</a:t>
-            </a:r>
-          </a:p>
-          <a:p>
-            <a:r>
-              <a:rPr lang="en-US" sz="2400" dirty="0"/>
-              <a:t>Allows you to keep track of changes made to your code and collaborate with other programmers</a:t>
-            </a:r>
-          </a:p>
-          <a:p>
-            <a:r>
-              <a:rPr lang="en-US" sz="2400" dirty="0"/>
-              <a:t>Allows you to easily revert changes and avoid costly mistakes</a:t>
-            </a:r>
-          </a:p>
-          <a:p>
-            <a:r>
-              <a:rPr lang="en-US" sz="2400" dirty="0"/>
-              <a:t>Overall an </a:t>
-            </a:r>
-            <a:r>
-              <a:rPr lang="en-US" sz="2400" b="1" dirty="0"/>
-              <a:t>absolutely indispensable</a:t>
-            </a:r>
-            <a:r>
-              <a:rPr lang="en-US" sz="2400" dirty="0"/>
-              <a:t> programming tool</a:t>
-            </a:r>
-            <a:endParaRPr lang="en-CA" sz="2400" dirty="0"/>
-          </a:p>
-        </p:txBody>
-      </p:sp>
-    </p:spTree>
-    <p:extLst>
-      <p:ext uri="{BB962C8B-B14F-4D97-AF65-F5344CB8AC3E}">
-        <p14:creationId xmlns:p14="http://schemas.microsoft.com/office/powerpoint/2010/main" val="3063112989"/>
       </p:ext>
     </p:extLst>
   </p:cSld>

</xml_diff>

<commit_message>
Adding material to Week 2
</commit_message>
<xml_diff>
--- a/PPTs/Week1.pptx
+++ b/PPTs/Week1.pptx
@@ -469,7 +469,7 @@
           <a:p>
             <a:fld id="{86503E50-C488-42F1-89DB-604CA89FA1A5}" type="datetimeFigureOut">
               <a:rPr lang="en-CA" smtClean="0"/>
-              <a:t>2022-06-20</a:t>
+              <a:t>2022-06-22</a:t>
             </a:fld>
             <a:endParaRPr lang="en-CA"/>
           </a:p>
@@ -1557,7 +1557,7 @@
           <a:p>
             <a:fld id="{86503E50-C488-42F1-89DB-604CA89FA1A5}" type="datetimeFigureOut">
               <a:rPr lang="en-CA" smtClean="0"/>
-              <a:t>2022-06-20</a:t>
+              <a:t>2022-06-22</a:t>
             </a:fld>
             <a:endParaRPr lang="en-CA"/>
           </a:p>
@@ -2537,7 +2537,7 @@
           <a:p>
             <a:fld id="{86503E50-C488-42F1-89DB-604CA89FA1A5}" type="datetimeFigureOut">
               <a:rPr lang="en-CA" smtClean="0"/>
-              <a:t>2022-06-20</a:t>
+              <a:t>2022-06-22</a:t>
             </a:fld>
             <a:endParaRPr lang="en-CA"/>
           </a:p>
@@ -3671,7 +3671,7 @@
           <a:p>
             <a:fld id="{86503E50-C488-42F1-89DB-604CA89FA1A5}" type="datetimeFigureOut">
               <a:rPr lang="en-CA" smtClean="0"/>
-              <a:t>2022-06-20</a:t>
+              <a:t>2022-06-22</a:t>
             </a:fld>
             <a:endParaRPr lang="en-CA"/>
           </a:p>
@@ -4704,7 +4704,7 @@
           <a:p>
             <a:fld id="{86503E50-C488-42F1-89DB-604CA89FA1A5}" type="datetimeFigureOut">
               <a:rPr lang="en-CA" smtClean="0"/>
-              <a:t>2022-06-20</a:t>
+              <a:t>2022-06-22</a:t>
             </a:fld>
             <a:endParaRPr lang="en-CA"/>
           </a:p>
@@ -5364,7 +5364,7 @@
           <a:p>
             <a:fld id="{86503E50-C488-42F1-89DB-604CA89FA1A5}" type="datetimeFigureOut">
               <a:rPr lang="en-CA" smtClean="0"/>
-              <a:t>2022-06-20</a:t>
+              <a:t>2022-06-22</a:t>
             </a:fld>
             <a:endParaRPr lang="en-CA"/>
           </a:p>
@@ -6225,7 +6225,7 @@
           <a:p>
             <a:fld id="{86503E50-C488-42F1-89DB-604CA89FA1A5}" type="datetimeFigureOut">
               <a:rPr lang="en-CA" smtClean="0"/>
-              <a:t>2022-06-20</a:t>
+              <a:t>2022-06-22</a:t>
             </a:fld>
             <a:endParaRPr lang="en-CA"/>
           </a:p>
@@ -6415,7 +6415,7 @@
           <a:p>
             <a:fld id="{86503E50-C488-42F1-89DB-604CA89FA1A5}" type="datetimeFigureOut">
               <a:rPr lang="en-CA" smtClean="0"/>
-              <a:t>2022-06-20</a:t>
+              <a:t>2022-06-22</a:t>
             </a:fld>
             <a:endParaRPr lang="en-CA"/>
           </a:p>
@@ -7387,7 +7387,7 @@
           <a:p>
             <a:fld id="{86503E50-C488-42F1-89DB-604CA89FA1A5}" type="datetimeFigureOut">
               <a:rPr lang="en-CA" smtClean="0"/>
-              <a:t>2022-06-20</a:t>
+              <a:t>2022-06-22</a:t>
             </a:fld>
             <a:endParaRPr lang="en-CA"/>
           </a:p>
@@ -7598,7 +7598,7 @@
           <a:p>
             <a:fld id="{86503E50-C488-42F1-89DB-604CA89FA1A5}" type="datetimeFigureOut">
               <a:rPr lang="en-CA" smtClean="0"/>
-              <a:t>2022-06-20</a:t>
+              <a:t>2022-06-22</a:t>
             </a:fld>
             <a:endParaRPr lang="en-CA"/>
           </a:p>
@@ -8632,7 +8632,7 @@
           <a:p>
             <a:fld id="{86503E50-C488-42F1-89DB-604CA89FA1A5}" type="datetimeFigureOut">
               <a:rPr lang="en-CA" smtClean="0"/>
-              <a:t>2022-06-20</a:t>
+              <a:t>2022-06-22</a:t>
             </a:fld>
             <a:endParaRPr lang="en-CA"/>
           </a:p>
@@ -8904,7 +8904,7 @@
           <a:p>
             <a:fld id="{86503E50-C488-42F1-89DB-604CA89FA1A5}" type="datetimeFigureOut">
               <a:rPr lang="en-CA" smtClean="0"/>
-              <a:t>2022-06-20</a:t>
+              <a:t>2022-06-22</a:t>
             </a:fld>
             <a:endParaRPr lang="en-CA"/>
           </a:p>
@@ -9314,7 +9314,7 @@
           <a:p>
             <a:fld id="{86503E50-C488-42F1-89DB-604CA89FA1A5}" type="datetimeFigureOut">
               <a:rPr lang="en-CA" smtClean="0"/>
-              <a:t>2022-06-20</a:t>
+              <a:t>2022-06-22</a:t>
             </a:fld>
             <a:endParaRPr lang="en-CA"/>
           </a:p>
@@ -9441,7 +9441,7 @@
           <a:p>
             <a:fld id="{86503E50-C488-42F1-89DB-604CA89FA1A5}" type="datetimeFigureOut">
               <a:rPr lang="en-CA" smtClean="0"/>
-              <a:t>2022-06-20</a:t>
+              <a:t>2022-06-22</a:t>
             </a:fld>
             <a:endParaRPr lang="en-CA"/>
           </a:p>
@@ -9536,7 +9536,7 @@
           <a:p>
             <a:fld id="{86503E50-C488-42F1-89DB-604CA89FA1A5}" type="datetimeFigureOut">
               <a:rPr lang="en-CA" smtClean="0"/>
-              <a:t>2022-06-20</a:t>
+              <a:t>2022-06-22</a:t>
             </a:fld>
             <a:endParaRPr lang="en-CA"/>
           </a:p>
@@ -10617,7 +10617,7 @@
           <a:p>
             <a:fld id="{86503E50-C488-42F1-89DB-604CA89FA1A5}" type="datetimeFigureOut">
               <a:rPr lang="en-CA" smtClean="0"/>
-              <a:t>2022-06-20</a:t>
+              <a:t>2022-06-22</a:t>
             </a:fld>
             <a:endParaRPr lang="en-CA"/>
           </a:p>
@@ -11725,7 +11725,7 @@
           <a:p>
             <a:fld id="{86503E50-C488-42F1-89DB-604CA89FA1A5}" type="datetimeFigureOut">
               <a:rPr lang="en-CA" smtClean="0"/>
-              <a:t>2022-06-20</a:t>
+              <a:t>2022-06-22</a:t>
             </a:fld>
             <a:endParaRPr lang="en-CA"/>
           </a:p>
@@ -12722,7 +12722,7 @@
           <a:p>
             <a:fld id="{86503E50-C488-42F1-89DB-604CA89FA1A5}" type="datetimeFigureOut">
               <a:rPr lang="en-CA" smtClean="0"/>
-              <a:t>2022-06-20</a:t>
+              <a:t>2022-06-22</a:t>
             </a:fld>
             <a:endParaRPr lang="en-CA"/>
           </a:p>
@@ -13495,14 +13495,14 @@
           <a:p>
             <a:pPr algn="ctr"/>
             <a:r>
-              <a:rPr lang="en-US" b="1">
+              <a:rPr lang="en-US" b="1" dirty="0">
                 <a:solidFill>
                   <a:schemeClr val="tx1"/>
                 </a:solidFill>
               </a:rPr>
               <a:t>INTRODUCTION TO PYTHON</a:t>
             </a:r>
-            <a:endParaRPr lang="en-CA" b="1">
+            <a:endParaRPr lang="en-CA" b="1" dirty="0">
               <a:solidFill>
                 <a:schemeClr val="tx1"/>
               </a:solidFill>
@@ -13540,10 +13540,10 @@
           <a:p>
             <a:pPr algn="ctr"/>
             <a:r>
-              <a:rPr lang="en-US" sz="2000"/>
+              <a:rPr lang="en-US" sz="2000" dirty="0"/>
               <a:t>SUMMER 2022</a:t>
             </a:r>
-            <a:endParaRPr lang="en-CA" sz="2000"/>
+            <a:endParaRPr lang="en-CA" sz="2000" dirty="0"/>
           </a:p>
         </p:txBody>
       </p:sp>

</xml_diff>